<commit_message>
final documentation and sequence diaram was added
</commit_message>
<xml_diff>
--- a/E-commerce site.pptx
+++ b/E-commerce site.pptx
@@ -8,18 +8,27 @@
     <p:sldId id="256" r:id="rId2"/>
     <p:sldId id="257" r:id="rId3"/>
     <p:sldId id="258" r:id="rId4"/>
-    <p:sldId id="259" r:id="rId5"/>
-    <p:sldId id="260" r:id="rId6"/>
-    <p:sldId id="262" r:id="rId7"/>
+    <p:sldId id="271" r:id="rId5"/>
+    <p:sldId id="259" r:id="rId6"/>
+    <p:sldId id="260" r:id="rId7"/>
     <p:sldId id="263" r:id="rId8"/>
     <p:sldId id="264" r:id="rId9"/>
     <p:sldId id="265" r:id="rId10"/>
     <p:sldId id="266" r:id="rId11"/>
     <p:sldId id="267" r:id="rId12"/>
-    <p:sldId id="270" r:id="rId13"/>
-    <p:sldId id="268" r:id="rId14"/>
-    <p:sldId id="269" r:id="rId15"/>
-    <p:sldId id="261" r:id="rId16"/>
+    <p:sldId id="272" r:id="rId13"/>
+    <p:sldId id="275" r:id="rId14"/>
+    <p:sldId id="276" r:id="rId15"/>
+    <p:sldId id="270" r:id="rId16"/>
+    <p:sldId id="277" r:id="rId17"/>
+    <p:sldId id="278" r:id="rId18"/>
+    <p:sldId id="279" r:id="rId19"/>
+    <p:sldId id="273" r:id="rId20"/>
+    <p:sldId id="274" r:id="rId21"/>
+    <p:sldId id="268" r:id="rId22"/>
+    <p:sldId id="262" r:id="rId23"/>
+    <p:sldId id="269" r:id="rId24"/>
+    <p:sldId id="261" r:id="rId25"/>
   </p:sldIdLst>
   <p:sldSz cx="12192000" cy="6858000"/>
   <p:notesSz cx="6858000" cy="9144000"/>
@@ -21924,7 +21933,7 @@
           <a:p>
             <a:fld id="{1198AF43-E227-4145-B12F-23C8F8DE73CD}" type="datetimeFigureOut">
               <a:rPr lang="en-US" smtClean="0"/>
-              <a:t>4/1/2019</a:t>
+              <a:t>4/2/2019</a:t>
             </a:fld>
             <a:endParaRPr lang="en-US"/>
           </a:p>
@@ -22131,7 +22140,7 @@
           <a:p>
             <a:fld id="{1198AF43-E227-4145-B12F-23C8F8DE73CD}" type="datetimeFigureOut">
               <a:rPr lang="en-US" smtClean="0"/>
-              <a:t>4/1/2019</a:t>
+              <a:t>4/2/2019</a:t>
             </a:fld>
             <a:endParaRPr lang="en-US"/>
           </a:p>
@@ -22311,7 +22320,7 @@
           <a:p>
             <a:fld id="{1198AF43-E227-4145-B12F-23C8F8DE73CD}" type="datetimeFigureOut">
               <a:rPr lang="en-US" smtClean="0"/>
-              <a:t>4/1/2019</a:t>
+              <a:t>4/2/2019</a:t>
             </a:fld>
             <a:endParaRPr lang="en-US"/>
           </a:p>
@@ -22516,7 +22525,7 @@
           <a:p>
             <a:fld id="{1198AF43-E227-4145-B12F-23C8F8DE73CD}" type="datetimeFigureOut">
               <a:rPr lang="en-US" smtClean="0"/>
-              <a:t>4/1/2019</a:t>
+              <a:t>4/2/2019</a:t>
             </a:fld>
             <a:endParaRPr lang="en-US"/>
           </a:p>
@@ -31414,7 +31423,7 @@
           <a:p>
             <a:fld id="{1198AF43-E227-4145-B12F-23C8F8DE73CD}" type="datetimeFigureOut">
               <a:rPr lang="en-US" smtClean="0"/>
-              <a:t>4/1/2019</a:t>
+              <a:t>4/2/2019</a:t>
             </a:fld>
             <a:endParaRPr lang="en-US"/>
           </a:p>
@@ -31688,7 +31697,7 @@
           <a:p>
             <a:fld id="{1198AF43-E227-4145-B12F-23C8F8DE73CD}" type="datetimeFigureOut">
               <a:rPr lang="en-US" smtClean="0"/>
-              <a:t>4/1/2019</a:t>
+              <a:t>4/2/2019</a:t>
             </a:fld>
             <a:endParaRPr lang="en-US"/>
           </a:p>
@@ -32086,7 +32095,7 @@
           <a:p>
             <a:fld id="{1198AF43-E227-4145-B12F-23C8F8DE73CD}" type="datetimeFigureOut">
               <a:rPr lang="en-US" smtClean="0"/>
-              <a:t>4/1/2019</a:t>
+              <a:t>4/2/2019</a:t>
             </a:fld>
             <a:endParaRPr lang="en-US"/>
           </a:p>
@@ -32204,7 +32213,7 @@
           <a:p>
             <a:fld id="{1198AF43-E227-4145-B12F-23C8F8DE73CD}" type="datetimeFigureOut">
               <a:rPr lang="en-US" smtClean="0"/>
-              <a:t>4/1/2019</a:t>
+              <a:t>4/2/2019</a:t>
             </a:fld>
             <a:endParaRPr lang="en-US"/>
           </a:p>
@@ -32299,7 +32308,7 @@
           <a:p>
             <a:fld id="{1198AF43-E227-4145-B12F-23C8F8DE73CD}" type="datetimeFigureOut">
               <a:rPr lang="en-US" smtClean="0"/>
-              <a:t>4/1/2019</a:t>
+              <a:t>4/2/2019</a:t>
             </a:fld>
             <a:endParaRPr lang="en-US"/>
           </a:p>
@@ -32589,7 +32598,7 @@
           <a:p>
             <a:fld id="{1198AF43-E227-4145-B12F-23C8F8DE73CD}" type="datetimeFigureOut">
               <a:rPr lang="en-US" smtClean="0"/>
-              <a:t>4/1/2019</a:t>
+              <a:t>4/2/2019</a:t>
             </a:fld>
             <a:endParaRPr lang="en-US"/>
           </a:p>
@@ -32869,7 +32878,7 @@
           <a:p>
             <a:fld id="{1198AF43-E227-4145-B12F-23C8F8DE73CD}" type="datetimeFigureOut">
               <a:rPr lang="en-US" smtClean="0"/>
-              <a:t>4/1/2019</a:t>
+              <a:t>4/2/2019</a:t>
             </a:fld>
             <a:endParaRPr lang="en-US"/>
           </a:p>
@@ -33119,7 +33128,7 @@
           <a:p>
             <a:fld id="{1198AF43-E227-4145-B12F-23C8F8DE73CD}" type="datetimeFigureOut">
               <a:rPr lang="en-US" smtClean="0"/>
-              <a:t>4/1/2019</a:t>
+              <a:t>4/2/2019</a:t>
             </a:fld>
             <a:endParaRPr lang="en-US"/>
           </a:p>
@@ -35756,7 +35765,7 @@
           <p:cNvPr id="2" name="Title 1">
             <a:extLst>
               <a:ext uri="{FF2B5EF4-FFF2-40B4-BE49-F238E27FC236}">
-                <a16:creationId xmlns:a16="http://schemas.microsoft.com/office/drawing/2014/main" id="{E0CD6082-DC2F-4FD6-A5C4-7C302B29BB8B}"/>
+                <a16:creationId xmlns:a16="http://schemas.microsoft.com/office/drawing/2014/main" id="{DD964444-56FF-4C40-8214-FC2BC218BE7B}"/>
               </a:ext>
             </a:extLst>
           </p:cNvPr>
@@ -35774,7 +35783,7 @@
           <a:p>
             <a:r>
               <a:rPr lang="en-US" dirty="0"/>
-              <a:t>UI design and code</a:t>
+              <a:t>Configuration management</a:t>
             </a:r>
           </a:p>
         </p:txBody>
@@ -35784,7 +35793,7 @@
           <p:cNvPr id="3" name="Content Placeholder 2">
             <a:extLst>
               <a:ext uri="{FF2B5EF4-FFF2-40B4-BE49-F238E27FC236}">
-                <a16:creationId xmlns:a16="http://schemas.microsoft.com/office/drawing/2014/main" id="{C0344863-5BB9-4277-A445-E84ABE8C0C17}"/>
+                <a16:creationId xmlns:a16="http://schemas.microsoft.com/office/drawing/2014/main" id="{4E674205-F160-4126-97A7-B6E83BB10F27}"/>
               </a:ext>
             </a:extLst>
           </p:cNvPr>
@@ -35800,10 +35809,481 @@
           <a:bodyPr/>
           <a:lstStyle/>
           <a:p>
+            <a:r>
+              <a:rPr lang="en-US" dirty="0" err="1"/>
+              <a:t>Github</a:t>
+            </a:r>
+            <a:r>
+              <a:rPr lang="en-US" dirty="0"/>
+              <a:t> was used to manage my project.</a:t>
+            </a:r>
+          </a:p>
+        </p:txBody>
+      </p:sp>
+    </p:spTree>
+    <p:extLst>
+      <p:ext uri="{BB962C8B-B14F-4D97-AF65-F5344CB8AC3E}">
+        <p14:creationId xmlns:p14="http://schemas.microsoft.com/office/powerpoint/2010/main" val="2682369826"/>
+      </p:ext>
+    </p:extLst>
+  </p:cSld>
+  <p:clrMapOvr>
+    <a:masterClrMapping/>
+  </p:clrMapOvr>
+</p:sld>
+</file>
+
+<file path=ppt/slides/slide13.xml><?xml version="1.0" encoding="utf-8"?>
+<p:sld xmlns:a="http://schemas.openxmlformats.org/drawingml/2006/main" xmlns:r="http://schemas.openxmlformats.org/officeDocument/2006/relationships" xmlns:p="http://schemas.openxmlformats.org/presentationml/2006/main">
+  <p:cSld>
+    <p:spTree>
+      <p:nvGrpSpPr>
+        <p:cNvPr id="1" name=""/>
+        <p:cNvGrpSpPr/>
+        <p:nvPr/>
+      </p:nvGrpSpPr>
+      <p:grpSpPr>
+        <a:xfrm>
+          <a:off x="0" y="0"/>
+          <a:ext cx="0" cy="0"/>
+          <a:chOff x="0" y="0"/>
+          <a:chExt cx="0" cy="0"/>
+        </a:xfrm>
+      </p:grpSpPr>
+      <p:sp>
+        <p:nvSpPr>
+          <p:cNvPr id="2" name="Title 1">
+            <a:extLst>
+              <a:ext uri="{FF2B5EF4-FFF2-40B4-BE49-F238E27FC236}">
+                <a16:creationId xmlns:a16="http://schemas.microsoft.com/office/drawing/2014/main" id="{AC8950FD-F87D-41F2-AD43-B78392B1A254}"/>
+              </a:ext>
+            </a:extLst>
+          </p:cNvPr>
+          <p:cNvSpPr>
+            <a:spLocks noGrp="1"/>
+          </p:cNvSpPr>
+          <p:nvPr>
+            <p:ph type="title"/>
+          </p:nvPr>
+        </p:nvSpPr>
+        <p:spPr/>
+        <p:txBody>
+          <a:bodyPr/>
+          <a:lstStyle/>
+          <a:p>
+            <a:r>
+              <a:rPr lang="en-US" dirty="0"/>
+              <a:t>Design: initial Class diagram</a:t>
+            </a:r>
+          </a:p>
+        </p:txBody>
+      </p:sp>
+      <p:pic>
+        <p:nvPicPr>
+          <p:cNvPr id="5" name="Content Placeholder 4">
+            <a:extLst>
+              <a:ext uri="{FF2B5EF4-FFF2-40B4-BE49-F238E27FC236}">
+                <a16:creationId xmlns:a16="http://schemas.microsoft.com/office/drawing/2014/main" id="{198A0ED1-C3CF-4BAD-A8B4-01EBB1B0C40D}"/>
+              </a:ext>
+            </a:extLst>
+          </p:cNvPr>
+          <p:cNvPicPr>
+            <a:picLocks noGrp="1" noChangeAspect="1"/>
+          </p:cNvPicPr>
+          <p:nvPr>
+            <p:ph idx="1"/>
+          </p:nvPr>
+        </p:nvPicPr>
+        <p:blipFill>
+          <a:blip r:embed="rId2">
+            <a:extLst>
+              <a:ext uri="{28A0092B-C50C-407E-A947-70E740481C1C}">
+                <a14:useLocalDpi xmlns:a14="http://schemas.microsoft.com/office/drawing/2010/main" val="0"/>
+              </a:ext>
+            </a:extLst>
+          </a:blip>
+          <a:stretch>
+            <a:fillRect/>
+          </a:stretch>
+        </p:blipFill>
+        <p:spPr>
+          <a:xfrm>
+            <a:off x="1984322" y="1916020"/>
+            <a:ext cx="5795111" cy="4580007"/>
+          </a:xfrm>
+        </p:spPr>
+      </p:pic>
+    </p:spTree>
+    <p:extLst>
+      <p:ext uri="{BB962C8B-B14F-4D97-AF65-F5344CB8AC3E}">
+        <p14:creationId xmlns:p14="http://schemas.microsoft.com/office/powerpoint/2010/main" val="3332341061"/>
+      </p:ext>
+    </p:extLst>
+  </p:cSld>
+  <p:clrMapOvr>
+    <a:masterClrMapping/>
+  </p:clrMapOvr>
+</p:sld>
+</file>
+
+<file path=ppt/slides/slide14.xml><?xml version="1.0" encoding="utf-8"?>
+<p:sld xmlns:a="http://schemas.openxmlformats.org/drawingml/2006/main" xmlns:r="http://schemas.openxmlformats.org/officeDocument/2006/relationships" xmlns:p="http://schemas.openxmlformats.org/presentationml/2006/main">
+  <p:cSld>
+    <p:spTree>
+      <p:nvGrpSpPr>
+        <p:cNvPr id="1" name=""/>
+        <p:cNvGrpSpPr/>
+        <p:nvPr/>
+      </p:nvGrpSpPr>
+      <p:grpSpPr>
+        <a:xfrm>
+          <a:off x="0" y="0"/>
+          <a:ext cx="0" cy="0"/>
+          <a:chOff x="0" y="0"/>
+          <a:chExt cx="0" cy="0"/>
+        </a:xfrm>
+      </p:grpSpPr>
+      <p:sp>
+        <p:nvSpPr>
+          <p:cNvPr id="2" name="Title 1">
+            <a:extLst>
+              <a:ext uri="{FF2B5EF4-FFF2-40B4-BE49-F238E27FC236}">
+                <a16:creationId xmlns:a16="http://schemas.microsoft.com/office/drawing/2014/main" id="{CB1295D7-379A-410C-83F8-A4CE00FB0228}"/>
+              </a:ext>
+            </a:extLst>
+          </p:cNvPr>
+          <p:cNvSpPr>
+            <a:spLocks noGrp="1"/>
+          </p:cNvSpPr>
+          <p:nvPr>
+            <p:ph type="title"/>
+          </p:nvPr>
+        </p:nvSpPr>
+        <p:spPr/>
+        <p:txBody>
+          <a:bodyPr/>
+          <a:lstStyle/>
+          <a:p>
+            <a:r>
+              <a:rPr lang="en-US" dirty="0" err="1"/>
+              <a:t>Er</a:t>
+            </a:r>
+            <a:r>
+              <a:rPr lang="en-US" dirty="0"/>
+              <a:t>-diagram</a:t>
+            </a:r>
+          </a:p>
+        </p:txBody>
+      </p:sp>
+      <p:pic>
+        <p:nvPicPr>
+          <p:cNvPr id="4" name="Content Placeholder 3">
+            <a:extLst>
+              <a:ext uri="{FF2B5EF4-FFF2-40B4-BE49-F238E27FC236}">
+                <a16:creationId xmlns:a16="http://schemas.microsoft.com/office/drawing/2014/main" id="{9482539E-22EB-4043-AAC5-95968962D13B}"/>
+              </a:ext>
+            </a:extLst>
+          </p:cNvPr>
+          <p:cNvPicPr>
+            <a:picLocks noGrp="1"/>
+          </p:cNvPicPr>
+          <p:nvPr>
+            <p:ph idx="1"/>
+          </p:nvPr>
+        </p:nvPicPr>
+        <p:blipFill>
+          <a:blip r:embed="rId2">
+            <a:extLst>
+              <a:ext uri="{28A0092B-C50C-407E-A947-70E740481C1C}">
+                <a14:useLocalDpi xmlns:a14="http://schemas.microsoft.com/office/drawing/2010/main" val="0"/>
+              </a:ext>
+            </a:extLst>
+          </a:blip>
+          <a:srcRect/>
+          <a:stretch>
+            <a:fillRect/>
+          </a:stretch>
+        </p:blipFill>
+        <p:spPr bwMode="auto">
+          <a:xfrm>
+            <a:off x="1024128" y="1780032"/>
+            <a:ext cx="8451176" cy="4925568"/>
+          </a:xfrm>
+          <a:prstGeom prst="rect">
+            <a:avLst/>
+          </a:prstGeom>
+          <a:noFill/>
+          <a:ln>
+            <a:noFill/>
+          </a:ln>
+        </p:spPr>
+      </p:pic>
+    </p:spTree>
+    <p:extLst>
+      <p:ext uri="{BB962C8B-B14F-4D97-AF65-F5344CB8AC3E}">
+        <p14:creationId xmlns:p14="http://schemas.microsoft.com/office/powerpoint/2010/main" val="1146789091"/>
+      </p:ext>
+    </p:extLst>
+  </p:cSld>
+  <p:clrMapOvr>
+    <a:masterClrMapping/>
+  </p:clrMapOvr>
+</p:sld>
+</file>
+
+<file path=ppt/slides/slide15.xml><?xml version="1.0" encoding="utf-8"?>
+<p:sld xmlns:a="http://schemas.openxmlformats.org/drawingml/2006/main" xmlns:r="http://schemas.openxmlformats.org/officeDocument/2006/relationships" xmlns:p="http://schemas.openxmlformats.org/presentationml/2006/main">
+  <p:cSld>
+    <p:bg>
+      <p:bgPr>
+        <a:solidFill>
+          <a:schemeClr val="bg1"/>
+        </a:solidFill>
+        <a:effectLst/>
+      </p:bgPr>
+    </p:bg>
+    <p:spTree>
+      <p:nvGrpSpPr>
+        <p:cNvPr id="1" name=""/>
+        <p:cNvGrpSpPr/>
+        <p:nvPr/>
+      </p:nvGrpSpPr>
+      <p:grpSpPr>
+        <a:xfrm>
+          <a:off x="0" y="0"/>
+          <a:ext cx="0" cy="0"/>
+          <a:chOff x="0" y="0"/>
+          <a:chExt cx="0" cy="0"/>
+        </a:xfrm>
+      </p:grpSpPr>
+      <p:sp>
+        <p:nvSpPr>
+          <p:cNvPr id="38" name="Rectangle 37">
+            <a:extLst>
+              <a:ext uri="{FF2B5EF4-FFF2-40B4-BE49-F238E27FC236}">
+                <a16:creationId xmlns:a16="http://schemas.microsoft.com/office/drawing/2014/main" id="{4FAE1107-CEC3-4041-8BAA-CDB6F6759B35}"/>
+              </a:ext>
+              <a:ext uri="{C183D7F6-B498-43B3-948B-1728B52AA6E4}">
+                <adec:decorative xmlns:adec="http://schemas.microsoft.com/office/drawing/2017/decorative" val="1"/>
+              </a:ext>
+            </a:extLst>
+          </p:cNvPr>
+          <p:cNvSpPr>
+            <a:spLocks noGrp="1" noRot="1" noChangeAspect="1" noMove="1" noResize="1" noEditPoints="1" noAdjustHandles="1" noChangeArrowheads="1" noChangeShapeType="1" noTextEdit="1"/>
+          </p:cNvSpPr>
+          <p:nvPr>
+            <p:extLst>
+              <p:ext uri="{386F3935-93C4-4BCD-93E2-E3B085C9AB24}">
+                <p16:designElem xmlns:p16="http://schemas.microsoft.com/office/powerpoint/2015/main" val="1"/>
+              </p:ext>
+            </p:extLst>
+          </p:nvPr>
+        </p:nvSpPr>
+        <p:spPr>
+          <a:xfrm>
+            <a:off x="0" y="0"/>
+            <a:ext cx="5468548" cy="6858000"/>
+          </a:xfrm>
+          <a:prstGeom prst="rect">
+            <a:avLst/>
+          </a:prstGeom>
+          <a:solidFill>
+            <a:schemeClr val="accent1"/>
+          </a:solidFill>
+          <a:ln>
+            <a:noFill/>
+          </a:ln>
+        </p:spPr>
+        <p:style>
+          <a:lnRef idx="2">
+            <a:schemeClr val="accent1">
+              <a:shade val="50000"/>
+            </a:schemeClr>
+          </a:lnRef>
+          <a:fillRef idx="1">
+            <a:schemeClr val="accent1"/>
+          </a:fillRef>
+          <a:effectRef idx="0">
+            <a:schemeClr val="accent1"/>
+          </a:effectRef>
+          <a:fontRef idx="minor">
+            <a:schemeClr val="lt1"/>
+          </a:fontRef>
+        </p:style>
+        <p:txBody>
+          <a:bodyPr rtlCol="0" anchor="ctr"/>
+          <a:lstStyle/>
+          <a:p>
+            <a:pPr algn="ctr"/>
             <a:endParaRPr lang="en-US"/>
           </a:p>
         </p:txBody>
       </p:sp>
+      <p:sp>
+        <p:nvSpPr>
+          <p:cNvPr id="2" name="Title 1">
+            <a:extLst>
+              <a:ext uri="{FF2B5EF4-FFF2-40B4-BE49-F238E27FC236}">
+                <a16:creationId xmlns:a16="http://schemas.microsoft.com/office/drawing/2014/main" id="{E0CD6082-DC2F-4FD6-A5C4-7C302B29BB8B}"/>
+              </a:ext>
+            </a:extLst>
+          </p:cNvPr>
+          <p:cNvSpPr>
+            <a:spLocks noGrp="1"/>
+          </p:cNvSpPr>
+          <p:nvPr>
+            <p:ph type="title"/>
+          </p:nvPr>
+        </p:nvSpPr>
+        <p:spPr>
+          <a:xfrm>
+            <a:off x="1024129" y="585216"/>
+            <a:ext cx="3779085" cy="1499616"/>
+          </a:xfrm>
+        </p:spPr>
+        <p:txBody>
+          <a:bodyPr>
+            <a:normAutofit/>
+          </a:bodyPr>
+          <a:lstStyle/>
+          <a:p>
+            <a:r>
+              <a:rPr lang="en-US" dirty="0">
+                <a:solidFill>
+                  <a:srgbClr val="FFFFFF"/>
+                </a:solidFill>
+              </a:rPr>
+              <a:t>UI design and code</a:t>
+            </a:r>
+          </a:p>
+        </p:txBody>
+      </p:sp>
+      <p:cxnSp>
+        <p:nvCxnSpPr>
+          <p:cNvPr id="40" name="Straight Connector 39">
+            <a:extLst>
+              <a:ext uri="{FF2B5EF4-FFF2-40B4-BE49-F238E27FC236}">
+                <a16:creationId xmlns:a16="http://schemas.microsoft.com/office/drawing/2014/main" id="{1AEA88FB-F5DD-45CE-AAE1-7B33D0ABDD25}"/>
+              </a:ext>
+              <a:ext uri="{C183D7F6-B498-43B3-948B-1728B52AA6E4}">
+                <adec:decorative xmlns:adec="http://schemas.microsoft.com/office/drawing/2017/decorative" val="1"/>
+              </a:ext>
+            </a:extLst>
+          </p:cNvPr>
+          <p:cNvCxnSpPr>
+            <a:cxnSpLocks noGrp="1" noRot="1" noChangeAspect="1" noMove="1" noResize="1" noEditPoints="1" noAdjustHandles="1" noChangeArrowheads="1" noChangeShapeType="1"/>
+          </p:cNvCxnSpPr>
+          <p:nvPr>
+            <p:extLst>
+              <p:ext uri="{386F3935-93C4-4BCD-93E2-E3B085C9AB24}">
+                <p16:designElem xmlns:p16="http://schemas.microsoft.com/office/powerpoint/2015/main" val="1"/>
+              </p:ext>
+            </p:extLst>
+          </p:nvPr>
+        </p:nvCxnSpPr>
+        <p:spPr>
+          <a:xfrm flipV="1">
+            <a:off x="762000" y="826324"/>
+            <a:ext cx="0" cy="914400"/>
+          </a:xfrm>
+          <a:prstGeom prst="line">
+            <a:avLst/>
+          </a:prstGeom>
+          <a:ln w="19050">
+            <a:solidFill>
+              <a:schemeClr val="accent1">
+                <a:lumMod val="20000"/>
+                <a:lumOff val="80000"/>
+              </a:schemeClr>
+            </a:solidFill>
+          </a:ln>
+        </p:spPr>
+        <p:style>
+          <a:lnRef idx="1">
+            <a:schemeClr val="accent1"/>
+          </a:lnRef>
+          <a:fillRef idx="0">
+            <a:schemeClr val="accent1"/>
+          </a:fillRef>
+          <a:effectRef idx="0">
+            <a:schemeClr val="accent1"/>
+          </a:effectRef>
+          <a:fontRef idx="minor">
+            <a:schemeClr val="tx1"/>
+          </a:fontRef>
+        </p:style>
+      </p:cxnSp>
+      <p:pic>
+        <p:nvPicPr>
+          <p:cNvPr id="17" name="Content Placeholder 16">
+            <a:extLst>
+              <a:ext uri="{FF2B5EF4-FFF2-40B4-BE49-F238E27FC236}">
+                <a16:creationId xmlns:a16="http://schemas.microsoft.com/office/drawing/2014/main" id="{42EEEE9A-1579-44EE-976B-281BEB6A294C}"/>
+              </a:ext>
+            </a:extLst>
+          </p:cNvPr>
+          <p:cNvPicPr>
+            <a:picLocks noGrp="1" noChangeAspect="1"/>
+          </p:cNvPicPr>
+          <p:nvPr>
+            <p:ph idx="1"/>
+          </p:nvPr>
+        </p:nvPicPr>
+        <p:blipFill>
+          <a:blip r:embed="rId2">
+            <a:extLst>
+              <a:ext uri="{28A0092B-C50C-407E-A947-70E740481C1C}">
+                <a14:useLocalDpi xmlns:a14="http://schemas.microsoft.com/office/drawing/2010/main" val="0"/>
+              </a:ext>
+            </a:extLst>
+          </a:blip>
+          <a:stretch>
+            <a:fillRect/>
+          </a:stretch>
+        </p:blipFill>
+        <p:spPr>
+          <a:xfrm>
+            <a:off x="243870" y="2457718"/>
+            <a:ext cx="4980807" cy="3147952"/>
+          </a:xfrm>
+        </p:spPr>
+      </p:pic>
+      <p:pic>
+        <p:nvPicPr>
+          <p:cNvPr id="33" name="Content Placeholder 14">
+            <a:extLst>
+              <a:ext uri="{FF2B5EF4-FFF2-40B4-BE49-F238E27FC236}">
+                <a16:creationId xmlns:a16="http://schemas.microsoft.com/office/drawing/2014/main" id="{9C3DD819-C682-4388-AC75-395D3913BB70}"/>
+              </a:ext>
+            </a:extLst>
+          </p:cNvPr>
+          <p:cNvPicPr>
+            <a:picLocks noChangeAspect="1"/>
+          </p:cNvPicPr>
+          <p:nvPr/>
+        </p:nvPicPr>
+        <p:blipFill>
+          <a:blip r:embed="rId3">
+            <a:extLst>
+              <a:ext uri="{28A0092B-C50C-407E-A947-70E740481C1C}">
+                <a14:useLocalDpi xmlns:a14="http://schemas.microsoft.com/office/drawing/2010/main" val="0"/>
+              </a:ext>
+            </a:extLst>
+          </a:blip>
+          <a:stretch>
+            <a:fillRect/>
+          </a:stretch>
+        </p:blipFill>
+        <p:spPr>
+          <a:xfrm>
+            <a:off x="6096000" y="2153678"/>
+            <a:ext cx="5455921" cy="2550643"/>
+          </a:xfrm>
+          <a:prstGeom prst="rect">
+            <a:avLst/>
+          </a:prstGeom>
+        </p:spPr>
+      </p:pic>
     </p:spTree>
     <p:extLst>
       <p:ext uri="{BB962C8B-B14F-4D97-AF65-F5344CB8AC3E}">
@@ -35817,7 +36297,555 @@
 </p:sld>
 </file>
 
-<file path=ppt/slides/slide13.xml><?xml version="1.0" encoding="utf-8"?>
+<file path=ppt/slides/slide16.xml><?xml version="1.0" encoding="utf-8"?>
+<p:sld xmlns:a="http://schemas.openxmlformats.org/drawingml/2006/main" xmlns:r="http://schemas.openxmlformats.org/officeDocument/2006/relationships" xmlns:p="http://schemas.openxmlformats.org/presentationml/2006/main">
+  <p:cSld>
+    <p:spTree>
+      <p:nvGrpSpPr>
+        <p:cNvPr id="1" name=""/>
+        <p:cNvGrpSpPr/>
+        <p:nvPr/>
+      </p:nvGrpSpPr>
+      <p:grpSpPr>
+        <a:xfrm>
+          <a:off x="0" y="0"/>
+          <a:ext cx="0" cy="0"/>
+          <a:chOff x="0" y="0"/>
+          <a:chExt cx="0" cy="0"/>
+        </a:xfrm>
+      </p:grpSpPr>
+      <p:sp>
+        <p:nvSpPr>
+          <p:cNvPr id="2" name="Title 1">
+            <a:extLst>
+              <a:ext uri="{FF2B5EF4-FFF2-40B4-BE49-F238E27FC236}">
+                <a16:creationId xmlns:a16="http://schemas.microsoft.com/office/drawing/2014/main" id="{A2362A4F-A828-44A9-8AA6-C7F9391B7B84}"/>
+              </a:ext>
+            </a:extLst>
+          </p:cNvPr>
+          <p:cNvSpPr>
+            <a:spLocks noGrp="1"/>
+          </p:cNvSpPr>
+          <p:nvPr>
+            <p:ph type="title"/>
+          </p:nvPr>
+        </p:nvSpPr>
+        <p:spPr/>
+        <p:txBody>
+          <a:bodyPr/>
+          <a:lstStyle/>
+          <a:p>
+            <a:endParaRPr lang="en-US"/>
+          </a:p>
+        </p:txBody>
+      </p:sp>
+      <p:pic>
+        <p:nvPicPr>
+          <p:cNvPr id="5" name="Content Placeholder 4">
+            <a:extLst>
+              <a:ext uri="{FF2B5EF4-FFF2-40B4-BE49-F238E27FC236}">
+                <a16:creationId xmlns:a16="http://schemas.microsoft.com/office/drawing/2014/main" id="{8252B152-1608-4E34-8A43-07A9751A7C60}"/>
+              </a:ext>
+            </a:extLst>
+          </p:cNvPr>
+          <p:cNvPicPr>
+            <a:picLocks noGrp="1" noChangeAspect="1"/>
+          </p:cNvPicPr>
+          <p:nvPr>
+            <p:ph idx="1"/>
+          </p:nvPr>
+        </p:nvPicPr>
+        <p:blipFill>
+          <a:blip r:embed="rId2">
+            <a:extLst>
+              <a:ext uri="{28A0092B-C50C-407E-A947-70E740481C1C}">
+                <a14:useLocalDpi xmlns:a14="http://schemas.microsoft.com/office/drawing/2010/main" val="0"/>
+              </a:ext>
+            </a:extLst>
+          </a:blip>
+          <a:stretch>
+            <a:fillRect/>
+          </a:stretch>
+        </p:blipFill>
+        <p:spPr>
+          <a:xfrm>
+            <a:off x="2701617" y="2286000"/>
+            <a:ext cx="6364904" cy="4022725"/>
+          </a:xfrm>
+        </p:spPr>
+      </p:pic>
+    </p:spTree>
+    <p:extLst>
+      <p:ext uri="{BB962C8B-B14F-4D97-AF65-F5344CB8AC3E}">
+        <p14:creationId xmlns:p14="http://schemas.microsoft.com/office/powerpoint/2010/main" val="238784140"/>
+      </p:ext>
+    </p:extLst>
+  </p:cSld>
+  <p:clrMapOvr>
+    <a:masterClrMapping/>
+  </p:clrMapOvr>
+</p:sld>
+</file>
+
+<file path=ppt/slides/slide17.xml><?xml version="1.0" encoding="utf-8"?>
+<p:sld xmlns:a="http://schemas.openxmlformats.org/drawingml/2006/main" xmlns:r="http://schemas.openxmlformats.org/officeDocument/2006/relationships" xmlns:p="http://schemas.openxmlformats.org/presentationml/2006/main">
+  <p:cSld>
+    <p:spTree>
+      <p:nvGrpSpPr>
+        <p:cNvPr id="1" name=""/>
+        <p:cNvGrpSpPr/>
+        <p:nvPr/>
+      </p:nvGrpSpPr>
+      <p:grpSpPr>
+        <a:xfrm>
+          <a:off x="0" y="0"/>
+          <a:ext cx="0" cy="0"/>
+          <a:chOff x="0" y="0"/>
+          <a:chExt cx="0" cy="0"/>
+        </a:xfrm>
+      </p:grpSpPr>
+      <p:sp>
+        <p:nvSpPr>
+          <p:cNvPr id="2" name="Title 1">
+            <a:extLst>
+              <a:ext uri="{FF2B5EF4-FFF2-40B4-BE49-F238E27FC236}">
+                <a16:creationId xmlns:a16="http://schemas.microsoft.com/office/drawing/2014/main" id="{944D8A72-D15E-4384-A823-2E4D6D295828}"/>
+              </a:ext>
+            </a:extLst>
+          </p:cNvPr>
+          <p:cNvSpPr>
+            <a:spLocks noGrp="1"/>
+          </p:cNvSpPr>
+          <p:nvPr>
+            <p:ph type="title"/>
+          </p:nvPr>
+        </p:nvSpPr>
+        <p:spPr/>
+        <p:txBody>
+          <a:bodyPr/>
+          <a:lstStyle/>
+          <a:p>
+            <a:endParaRPr lang="en-US"/>
+          </a:p>
+        </p:txBody>
+      </p:sp>
+      <p:pic>
+        <p:nvPicPr>
+          <p:cNvPr id="5" name="Content Placeholder 4">
+            <a:extLst>
+              <a:ext uri="{FF2B5EF4-FFF2-40B4-BE49-F238E27FC236}">
+                <a16:creationId xmlns:a16="http://schemas.microsoft.com/office/drawing/2014/main" id="{391CE8BA-1C04-4ABA-8251-352A0D3AFEF5}"/>
+              </a:ext>
+            </a:extLst>
+          </p:cNvPr>
+          <p:cNvPicPr>
+            <a:picLocks noGrp="1" noChangeAspect="1"/>
+          </p:cNvPicPr>
+          <p:nvPr>
+            <p:ph idx="1"/>
+          </p:nvPr>
+        </p:nvPicPr>
+        <p:blipFill>
+          <a:blip r:embed="rId2">
+            <a:extLst>
+              <a:ext uri="{28A0092B-C50C-407E-A947-70E740481C1C}">
+                <a14:useLocalDpi xmlns:a14="http://schemas.microsoft.com/office/drawing/2010/main" val="0"/>
+              </a:ext>
+            </a:extLst>
+          </a:blip>
+          <a:stretch>
+            <a:fillRect/>
+          </a:stretch>
+        </p:blipFill>
+        <p:spPr>
+          <a:xfrm>
+            <a:off x="1584781" y="2286000"/>
+            <a:ext cx="8598575" cy="4022725"/>
+          </a:xfrm>
+        </p:spPr>
+      </p:pic>
+    </p:spTree>
+    <p:extLst>
+      <p:ext uri="{BB962C8B-B14F-4D97-AF65-F5344CB8AC3E}">
+        <p14:creationId xmlns:p14="http://schemas.microsoft.com/office/powerpoint/2010/main" val="2674638143"/>
+      </p:ext>
+    </p:extLst>
+  </p:cSld>
+  <p:clrMapOvr>
+    <a:masterClrMapping/>
+  </p:clrMapOvr>
+</p:sld>
+</file>
+
+<file path=ppt/slides/slide18.xml><?xml version="1.0" encoding="utf-8"?>
+<p:sld xmlns:a="http://schemas.openxmlformats.org/drawingml/2006/main" xmlns:r="http://schemas.openxmlformats.org/officeDocument/2006/relationships" xmlns:p="http://schemas.openxmlformats.org/presentationml/2006/main">
+  <p:cSld>
+    <p:spTree>
+      <p:nvGrpSpPr>
+        <p:cNvPr id="1" name=""/>
+        <p:cNvGrpSpPr/>
+        <p:nvPr/>
+      </p:nvGrpSpPr>
+      <p:grpSpPr>
+        <a:xfrm>
+          <a:off x="0" y="0"/>
+          <a:ext cx="0" cy="0"/>
+          <a:chOff x="0" y="0"/>
+          <a:chExt cx="0" cy="0"/>
+        </a:xfrm>
+      </p:grpSpPr>
+      <p:sp>
+        <p:nvSpPr>
+          <p:cNvPr id="2" name="Title 1">
+            <a:extLst>
+              <a:ext uri="{FF2B5EF4-FFF2-40B4-BE49-F238E27FC236}">
+                <a16:creationId xmlns:a16="http://schemas.microsoft.com/office/drawing/2014/main" id="{E4A12A28-F6F5-48A4-A9AB-835DC5AA5755}"/>
+              </a:ext>
+            </a:extLst>
+          </p:cNvPr>
+          <p:cNvSpPr>
+            <a:spLocks noGrp="1"/>
+          </p:cNvSpPr>
+          <p:nvPr>
+            <p:ph type="title"/>
+          </p:nvPr>
+        </p:nvSpPr>
+        <p:spPr/>
+        <p:txBody>
+          <a:bodyPr/>
+          <a:lstStyle/>
+          <a:p>
+            <a:endParaRPr lang="en-US"/>
+          </a:p>
+        </p:txBody>
+      </p:sp>
+      <p:pic>
+        <p:nvPicPr>
+          <p:cNvPr id="5" name="Content Placeholder 4">
+            <a:extLst>
+              <a:ext uri="{FF2B5EF4-FFF2-40B4-BE49-F238E27FC236}">
+                <a16:creationId xmlns:a16="http://schemas.microsoft.com/office/drawing/2014/main" id="{6B814F64-DF58-4D59-ABDD-7BF74B703342}"/>
+              </a:ext>
+            </a:extLst>
+          </p:cNvPr>
+          <p:cNvPicPr>
+            <a:picLocks noGrp="1" noChangeAspect="1"/>
+          </p:cNvPicPr>
+          <p:nvPr>
+            <p:ph idx="1"/>
+          </p:nvPr>
+        </p:nvPicPr>
+        <p:blipFill>
+          <a:blip r:embed="rId2">
+            <a:extLst>
+              <a:ext uri="{28A0092B-C50C-407E-A947-70E740481C1C}">
+                <a14:useLocalDpi xmlns:a14="http://schemas.microsoft.com/office/drawing/2010/main" val="0"/>
+              </a:ext>
+            </a:extLst>
+          </a:blip>
+          <a:stretch>
+            <a:fillRect/>
+          </a:stretch>
+        </p:blipFill>
+        <p:spPr>
+          <a:xfrm>
+            <a:off x="1024128" y="2308305"/>
+            <a:ext cx="8808985" cy="4549695"/>
+          </a:xfrm>
+        </p:spPr>
+      </p:pic>
+    </p:spTree>
+    <p:extLst>
+      <p:ext uri="{BB962C8B-B14F-4D97-AF65-F5344CB8AC3E}">
+        <p14:creationId xmlns:p14="http://schemas.microsoft.com/office/powerpoint/2010/main" val="2939770862"/>
+      </p:ext>
+    </p:extLst>
+  </p:cSld>
+  <p:clrMapOvr>
+    <a:masterClrMapping/>
+  </p:clrMapOvr>
+</p:sld>
+</file>
+
+<file path=ppt/slides/slide19.xml><?xml version="1.0" encoding="utf-8"?>
+<p:sld xmlns:a="http://schemas.openxmlformats.org/drawingml/2006/main" xmlns:r="http://schemas.openxmlformats.org/officeDocument/2006/relationships" xmlns:p="http://schemas.openxmlformats.org/presentationml/2006/main">
+  <p:cSld>
+    <p:spTree>
+      <p:nvGrpSpPr>
+        <p:cNvPr id="1" name=""/>
+        <p:cNvGrpSpPr/>
+        <p:nvPr/>
+      </p:nvGrpSpPr>
+      <p:grpSpPr>
+        <a:xfrm>
+          <a:off x="0" y="0"/>
+          <a:ext cx="0" cy="0"/>
+          <a:chOff x="0" y="0"/>
+          <a:chExt cx="0" cy="0"/>
+        </a:xfrm>
+      </p:grpSpPr>
+      <p:sp>
+        <p:nvSpPr>
+          <p:cNvPr id="2" name="Title 1">
+            <a:extLst>
+              <a:ext uri="{FF2B5EF4-FFF2-40B4-BE49-F238E27FC236}">
+                <a16:creationId xmlns:a16="http://schemas.microsoft.com/office/drawing/2014/main" id="{F169C368-AF8C-440E-8754-ACD6B3D27336}"/>
+              </a:ext>
+            </a:extLst>
+          </p:cNvPr>
+          <p:cNvSpPr>
+            <a:spLocks noGrp="1"/>
+          </p:cNvSpPr>
+          <p:nvPr>
+            <p:ph type="title"/>
+          </p:nvPr>
+        </p:nvSpPr>
+        <p:spPr/>
+        <p:txBody>
+          <a:bodyPr/>
+          <a:lstStyle/>
+          <a:p>
+            <a:r>
+              <a:rPr lang="en-US" dirty="0"/>
+              <a:t>cart Ui</a:t>
+            </a:r>
+          </a:p>
+        </p:txBody>
+      </p:sp>
+      <p:pic>
+        <p:nvPicPr>
+          <p:cNvPr id="5" name="Content Placeholder 4">
+            <a:extLst>
+              <a:ext uri="{FF2B5EF4-FFF2-40B4-BE49-F238E27FC236}">
+                <a16:creationId xmlns:a16="http://schemas.microsoft.com/office/drawing/2014/main" id="{D27F173B-A330-4224-A56C-D07ACFE33907}"/>
+              </a:ext>
+            </a:extLst>
+          </p:cNvPr>
+          <p:cNvPicPr>
+            <a:picLocks noGrp="1" noChangeAspect="1"/>
+          </p:cNvPicPr>
+          <p:nvPr>
+            <p:ph idx="1"/>
+          </p:nvPr>
+        </p:nvPicPr>
+        <p:blipFill>
+          <a:blip r:embed="rId2">
+            <a:extLst>
+              <a:ext uri="{28A0092B-C50C-407E-A947-70E740481C1C}">
+                <a14:useLocalDpi xmlns:a14="http://schemas.microsoft.com/office/drawing/2010/main" val="0"/>
+              </a:ext>
+            </a:extLst>
+          </a:blip>
+          <a:stretch>
+            <a:fillRect/>
+          </a:stretch>
+        </p:blipFill>
+        <p:spPr>
+          <a:xfrm>
+            <a:off x="1024128" y="2744588"/>
+            <a:ext cx="9720072" cy="3608697"/>
+          </a:xfrm>
+        </p:spPr>
+      </p:pic>
+    </p:spTree>
+    <p:extLst>
+      <p:ext uri="{BB962C8B-B14F-4D97-AF65-F5344CB8AC3E}">
+        <p14:creationId xmlns:p14="http://schemas.microsoft.com/office/powerpoint/2010/main" val="960304418"/>
+      </p:ext>
+    </p:extLst>
+  </p:cSld>
+  <p:clrMapOvr>
+    <a:masterClrMapping/>
+  </p:clrMapOvr>
+</p:sld>
+</file>
+
+<file path=ppt/slides/slide2.xml><?xml version="1.0" encoding="utf-8"?>
+<p:sld xmlns:a="http://schemas.openxmlformats.org/drawingml/2006/main" xmlns:r="http://schemas.openxmlformats.org/officeDocument/2006/relationships" xmlns:p="http://schemas.openxmlformats.org/presentationml/2006/main">
+  <p:cSld>
+    <p:spTree>
+      <p:nvGrpSpPr>
+        <p:cNvPr id="1" name=""/>
+        <p:cNvGrpSpPr/>
+        <p:nvPr/>
+      </p:nvGrpSpPr>
+      <p:grpSpPr>
+        <a:xfrm>
+          <a:off x="0" y="0"/>
+          <a:ext cx="0" cy="0"/>
+          <a:chOff x="0" y="0"/>
+          <a:chExt cx="0" cy="0"/>
+        </a:xfrm>
+      </p:grpSpPr>
+      <p:sp>
+        <p:nvSpPr>
+          <p:cNvPr id="2" name="Title 1">
+            <a:extLst>
+              <a:ext uri="{FF2B5EF4-FFF2-40B4-BE49-F238E27FC236}">
+                <a16:creationId xmlns:a16="http://schemas.microsoft.com/office/drawing/2014/main" id="{9CF86A62-397A-4BF9-8AA2-EC3C5630EF09}"/>
+              </a:ext>
+            </a:extLst>
+          </p:cNvPr>
+          <p:cNvSpPr>
+            <a:spLocks noGrp="1"/>
+          </p:cNvSpPr>
+          <p:nvPr>
+            <p:ph type="title"/>
+          </p:nvPr>
+        </p:nvSpPr>
+        <p:spPr/>
+        <p:txBody>
+          <a:bodyPr/>
+          <a:lstStyle/>
+          <a:p>
+            <a:r>
+              <a:rPr lang="en-US" dirty="0"/>
+              <a:t>Introduction</a:t>
+            </a:r>
+          </a:p>
+        </p:txBody>
+      </p:sp>
+      <p:sp>
+        <p:nvSpPr>
+          <p:cNvPr id="3" name="Content Placeholder 2">
+            <a:extLst>
+              <a:ext uri="{FF2B5EF4-FFF2-40B4-BE49-F238E27FC236}">
+                <a16:creationId xmlns:a16="http://schemas.microsoft.com/office/drawing/2014/main" id="{2C497AAA-0146-4F14-BD53-51EE77328D50}"/>
+              </a:ext>
+            </a:extLst>
+          </p:cNvPr>
+          <p:cNvSpPr>
+            <a:spLocks noGrp="1"/>
+          </p:cNvSpPr>
+          <p:nvPr>
+            <p:ph idx="1"/>
+          </p:nvPr>
+        </p:nvSpPr>
+        <p:spPr/>
+        <p:txBody>
+          <a:bodyPr/>
+          <a:lstStyle/>
+          <a:p>
+            <a:r>
+              <a:rPr lang="en-US" dirty="0"/>
+              <a:t>E-commerce is purchasing, selling and exchanging goods and services over internet.</a:t>
+            </a:r>
+          </a:p>
+          <a:p>
+            <a:r>
+              <a:rPr lang="en-US" dirty="0"/>
+              <a:t>The main purpose of e-commerce site is that any person can buy as well as sell products.</a:t>
+            </a:r>
+          </a:p>
+        </p:txBody>
+      </p:sp>
+    </p:spTree>
+    <p:extLst>
+      <p:ext uri="{BB962C8B-B14F-4D97-AF65-F5344CB8AC3E}">
+        <p14:creationId xmlns:p14="http://schemas.microsoft.com/office/powerpoint/2010/main" val="2739682461"/>
+      </p:ext>
+    </p:extLst>
+  </p:cSld>
+  <p:clrMapOvr>
+    <a:masterClrMapping/>
+  </p:clrMapOvr>
+</p:sld>
+</file>
+
+<file path=ppt/slides/slide20.xml><?xml version="1.0" encoding="utf-8"?>
+<p:sld xmlns:a="http://schemas.openxmlformats.org/drawingml/2006/main" xmlns:r="http://schemas.openxmlformats.org/officeDocument/2006/relationships" xmlns:p="http://schemas.openxmlformats.org/presentationml/2006/main">
+  <p:cSld>
+    <p:spTree>
+      <p:nvGrpSpPr>
+        <p:cNvPr id="1" name=""/>
+        <p:cNvGrpSpPr/>
+        <p:nvPr/>
+      </p:nvGrpSpPr>
+      <p:grpSpPr>
+        <a:xfrm>
+          <a:off x="0" y="0"/>
+          <a:ext cx="0" cy="0"/>
+          <a:chOff x="0" y="0"/>
+          <a:chExt cx="0" cy="0"/>
+        </a:xfrm>
+      </p:grpSpPr>
+      <p:sp>
+        <p:nvSpPr>
+          <p:cNvPr id="2" name="Title 1">
+            <a:extLst>
+              <a:ext uri="{FF2B5EF4-FFF2-40B4-BE49-F238E27FC236}">
+                <a16:creationId xmlns:a16="http://schemas.microsoft.com/office/drawing/2014/main" id="{CAC3E3B8-E41D-4555-B1D1-F8AF8C431D99}"/>
+              </a:ext>
+            </a:extLst>
+          </p:cNvPr>
+          <p:cNvSpPr>
+            <a:spLocks noGrp="1"/>
+          </p:cNvSpPr>
+          <p:nvPr>
+            <p:ph type="title"/>
+          </p:nvPr>
+        </p:nvSpPr>
+        <p:spPr/>
+        <p:txBody>
+          <a:bodyPr/>
+          <a:lstStyle/>
+          <a:p>
+            <a:r>
+              <a:rPr lang="en-US" dirty="0"/>
+              <a:t>Cart code</a:t>
+            </a:r>
+          </a:p>
+        </p:txBody>
+      </p:sp>
+      <p:pic>
+        <p:nvPicPr>
+          <p:cNvPr id="5" name="Content Placeholder 4">
+            <a:extLst>
+              <a:ext uri="{FF2B5EF4-FFF2-40B4-BE49-F238E27FC236}">
+                <a16:creationId xmlns:a16="http://schemas.microsoft.com/office/drawing/2014/main" id="{74C3FB03-6D67-4B4B-A2E9-3AF1C3ED2483}"/>
+              </a:ext>
+            </a:extLst>
+          </p:cNvPr>
+          <p:cNvPicPr>
+            <a:picLocks noGrp="1" noChangeAspect="1"/>
+          </p:cNvPicPr>
+          <p:nvPr>
+            <p:ph idx="1"/>
+          </p:nvPr>
+        </p:nvPicPr>
+        <p:blipFill>
+          <a:blip r:embed="rId2">
+            <a:extLst>
+              <a:ext uri="{28A0092B-C50C-407E-A947-70E740481C1C}">
+                <a14:useLocalDpi xmlns:a14="http://schemas.microsoft.com/office/drawing/2010/main" val="0"/>
+              </a:ext>
+            </a:extLst>
+          </a:blip>
+          <a:stretch>
+            <a:fillRect/>
+          </a:stretch>
+        </p:blipFill>
+        <p:spPr>
+          <a:xfrm>
+            <a:off x="2901813" y="2286000"/>
+            <a:ext cx="5964511" cy="4022725"/>
+          </a:xfrm>
+        </p:spPr>
+      </p:pic>
+    </p:spTree>
+    <p:extLst>
+      <p:ext uri="{BB962C8B-B14F-4D97-AF65-F5344CB8AC3E}">
+        <p14:creationId xmlns:p14="http://schemas.microsoft.com/office/powerpoint/2010/main" val="1899492486"/>
+      </p:ext>
+    </p:extLst>
+  </p:cSld>
+  <p:clrMapOvr>
+    <a:masterClrMapping/>
+  </p:clrMapOvr>
+</p:sld>
+</file>
+
+<file path=ppt/slides/slide21.xml><?xml version="1.0" encoding="utf-8"?>
 <p:sld xmlns:a="http://schemas.openxmlformats.org/drawingml/2006/main" xmlns:r="http://schemas.openxmlformats.org/officeDocument/2006/relationships" xmlns:p="http://schemas.openxmlformats.org/presentationml/2006/main">
   <p:cSld>
     <p:spTree>
@@ -35921,7 +36949,116 @@
 </p:sld>
 </file>
 
-<file path=ppt/slides/slide14.xml><?xml version="1.0" encoding="utf-8"?>
+<file path=ppt/slides/slide22.xml><?xml version="1.0" encoding="utf-8"?>
+<p:sld xmlns:a="http://schemas.openxmlformats.org/drawingml/2006/main" xmlns:r="http://schemas.openxmlformats.org/officeDocument/2006/relationships" xmlns:p="http://schemas.openxmlformats.org/presentationml/2006/main">
+  <p:cSld>
+    <p:spTree>
+      <p:nvGrpSpPr>
+        <p:cNvPr id="1" name=""/>
+        <p:cNvGrpSpPr/>
+        <p:nvPr/>
+      </p:nvGrpSpPr>
+      <p:grpSpPr>
+        <a:xfrm>
+          <a:off x="0" y="0"/>
+          <a:ext cx="0" cy="0"/>
+          <a:chOff x="0" y="0"/>
+          <a:chExt cx="0" cy="0"/>
+        </a:xfrm>
+      </p:grpSpPr>
+      <p:sp>
+        <p:nvSpPr>
+          <p:cNvPr id="2" name="Title 1">
+            <a:extLst>
+              <a:ext uri="{FF2B5EF4-FFF2-40B4-BE49-F238E27FC236}">
+                <a16:creationId xmlns:a16="http://schemas.microsoft.com/office/drawing/2014/main" id="{E2F91319-3C0A-4924-AAC2-B4AD0F6AFBD9}"/>
+              </a:ext>
+            </a:extLst>
+          </p:cNvPr>
+          <p:cNvSpPr>
+            <a:spLocks noGrp="1"/>
+          </p:cNvSpPr>
+          <p:nvPr>
+            <p:ph type="title"/>
+          </p:nvPr>
+        </p:nvSpPr>
+        <p:spPr/>
+        <p:txBody>
+          <a:bodyPr/>
+          <a:lstStyle/>
+          <a:p>
+            <a:r>
+              <a:rPr lang="en-US" dirty="0"/>
+              <a:t>Unit Testing</a:t>
+            </a:r>
+          </a:p>
+        </p:txBody>
+      </p:sp>
+      <p:sp>
+        <p:nvSpPr>
+          <p:cNvPr id="3" name="Content Placeholder 2">
+            <a:extLst>
+              <a:ext uri="{FF2B5EF4-FFF2-40B4-BE49-F238E27FC236}">
+                <a16:creationId xmlns:a16="http://schemas.microsoft.com/office/drawing/2014/main" id="{3496C24E-0E9B-4E4A-B827-5F95FE41A520}"/>
+              </a:ext>
+            </a:extLst>
+          </p:cNvPr>
+          <p:cNvSpPr>
+            <a:spLocks noGrp="1"/>
+          </p:cNvSpPr>
+          <p:nvPr>
+            <p:ph idx="1"/>
+          </p:nvPr>
+        </p:nvSpPr>
+        <p:spPr/>
+        <p:txBody>
+          <a:bodyPr/>
+          <a:lstStyle/>
+          <a:p>
+            <a:r>
+              <a:rPr lang="en-US" dirty="0"/>
+              <a:t>One test for one function.</a:t>
+            </a:r>
+          </a:p>
+          <a:p>
+            <a:r>
+              <a:rPr lang="en-US" dirty="0"/>
+              <a:t>Each method test one thing only.</a:t>
+            </a:r>
+          </a:p>
+          <a:p>
+            <a:r>
+              <a:rPr lang="en-US" dirty="0"/>
+              <a:t>Only one assert in one method.</a:t>
+            </a:r>
+          </a:p>
+          <a:p>
+            <a:r>
+              <a:rPr lang="en-US" dirty="0"/>
+              <a:t>Independent test. No data sharing </a:t>
+            </a:r>
+            <a:r>
+              <a:rPr lang="en-US"/>
+              <a:t>between test.</a:t>
+            </a:r>
+            <a:endParaRPr lang="en-US" dirty="0"/>
+          </a:p>
+        </p:txBody>
+      </p:sp>
+    </p:spTree>
+    <p:extLst>
+      <p:ext uri="{BB962C8B-B14F-4D97-AF65-F5344CB8AC3E}">
+        <p14:creationId xmlns:p14="http://schemas.microsoft.com/office/powerpoint/2010/main" val="1800858415"/>
+      </p:ext>
+    </p:extLst>
+  </p:cSld>
+  <p:clrMapOvr>
+    <a:masterClrMapping/>
+  </p:clrMapOvr>
+</p:sld>
+</file>
+
+<file path=ppt/slides/slide23.xml><?xml version="1.0" encoding="utf-8"?>
 <p:sld xmlns:a="http://schemas.openxmlformats.org/drawingml/2006/main" xmlns:r="http://schemas.openxmlformats.org/officeDocument/2006/relationships" xmlns:p="http://schemas.openxmlformats.org/presentationml/2006/main">
   <p:cSld>
     <p:spTree>
@@ -35993,6 +37130,31 @@
             </a:r>
           </a:p>
           <a:p>
+            <a:r>
+              <a:rPr lang="en-US" dirty="0"/>
+              <a:t>User can sign up with social media like </a:t>
+            </a:r>
+            <a:r>
+              <a:rPr lang="en-US" dirty="0" err="1"/>
+              <a:t>facebook</a:t>
+            </a:r>
+            <a:r>
+              <a:rPr lang="en-US" dirty="0"/>
+              <a:t>, google </a:t>
+            </a:r>
+            <a:r>
+              <a:rPr lang="en-US" dirty="0" err="1"/>
+              <a:t>etc</a:t>
+            </a:r>
+            <a:endParaRPr lang="en-US" dirty="0"/>
+          </a:p>
+          <a:p>
+            <a:r>
+              <a:rPr lang="en-US" dirty="0"/>
+              <a:t>GUI modification for more interactive experience.</a:t>
+            </a:r>
+          </a:p>
+          <a:p>
             <a:pPr marL="0" indent="0">
               <a:buNone/>
             </a:pPr>
@@ -36013,7 +37175,7 @@
 </p:sld>
 </file>
 
-<file path=ppt/slides/slide15.xml><?xml version="1.0" encoding="utf-8"?>
+<file path=ppt/slides/slide24.xml><?xml version="1.0" encoding="utf-8"?>
 <p:sld xmlns:a="http://schemas.openxmlformats.org/drawingml/2006/main" xmlns:r="http://schemas.openxmlformats.org/officeDocument/2006/relationships" xmlns:p="http://schemas.openxmlformats.org/presentationml/2006/main">
   <p:cSld>
     <p:spTree>
@@ -36053,11 +37215,7 @@
           <a:p>
             <a:r>
               <a:rPr lang="en-US" dirty="0"/>
-              <a:t>Future </a:t>
-            </a:r>
-            <a:r>
-              <a:rPr lang="en-US"/>
-              <a:t>of E-commerce in Nepal</a:t>
+              <a:t>Conclusion</a:t>
             </a:r>
           </a:p>
         </p:txBody>
@@ -36083,7 +37241,7 @@
           <a:bodyPr/>
           <a:lstStyle/>
           <a:p>
-            <a:endParaRPr lang="en-US"/>
+            <a:endParaRPr lang="en-US" dirty="0"/>
           </a:p>
         </p:txBody>
       </p:sp>
@@ -36091,98 +37249,6 @@
     <p:extLst>
       <p:ext uri="{BB962C8B-B14F-4D97-AF65-F5344CB8AC3E}">
         <p14:creationId xmlns:p14="http://schemas.microsoft.com/office/powerpoint/2010/main" val="734548296"/>
-      </p:ext>
-    </p:extLst>
-  </p:cSld>
-  <p:clrMapOvr>
-    <a:masterClrMapping/>
-  </p:clrMapOvr>
-</p:sld>
-</file>
-
-<file path=ppt/slides/slide2.xml><?xml version="1.0" encoding="utf-8"?>
-<p:sld xmlns:a="http://schemas.openxmlformats.org/drawingml/2006/main" xmlns:r="http://schemas.openxmlformats.org/officeDocument/2006/relationships" xmlns:p="http://schemas.openxmlformats.org/presentationml/2006/main">
-  <p:cSld>
-    <p:spTree>
-      <p:nvGrpSpPr>
-        <p:cNvPr id="1" name=""/>
-        <p:cNvGrpSpPr/>
-        <p:nvPr/>
-      </p:nvGrpSpPr>
-      <p:grpSpPr>
-        <a:xfrm>
-          <a:off x="0" y="0"/>
-          <a:ext cx="0" cy="0"/>
-          <a:chOff x="0" y="0"/>
-          <a:chExt cx="0" cy="0"/>
-        </a:xfrm>
-      </p:grpSpPr>
-      <p:sp>
-        <p:nvSpPr>
-          <p:cNvPr id="2" name="Title 1">
-            <a:extLst>
-              <a:ext uri="{FF2B5EF4-FFF2-40B4-BE49-F238E27FC236}">
-                <a16:creationId xmlns:a16="http://schemas.microsoft.com/office/drawing/2014/main" id="{9CF86A62-397A-4BF9-8AA2-EC3C5630EF09}"/>
-              </a:ext>
-            </a:extLst>
-          </p:cNvPr>
-          <p:cNvSpPr>
-            <a:spLocks noGrp="1"/>
-          </p:cNvSpPr>
-          <p:nvPr>
-            <p:ph type="title"/>
-          </p:nvPr>
-        </p:nvSpPr>
-        <p:spPr/>
-        <p:txBody>
-          <a:bodyPr/>
-          <a:lstStyle/>
-          <a:p>
-            <a:r>
-              <a:rPr lang="en-US" dirty="0"/>
-              <a:t>Purpose</a:t>
-            </a:r>
-          </a:p>
-        </p:txBody>
-      </p:sp>
-      <p:sp>
-        <p:nvSpPr>
-          <p:cNvPr id="3" name="Content Placeholder 2">
-            <a:extLst>
-              <a:ext uri="{FF2B5EF4-FFF2-40B4-BE49-F238E27FC236}">
-                <a16:creationId xmlns:a16="http://schemas.microsoft.com/office/drawing/2014/main" id="{2C497AAA-0146-4F14-BD53-51EE77328D50}"/>
-              </a:ext>
-            </a:extLst>
-          </p:cNvPr>
-          <p:cNvSpPr>
-            <a:spLocks noGrp="1"/>
-          </p:cNvSpPr>
-          <p:nvPr>
-            <p:ph idx="1"/>
-          </p:nvPr>
-        </p:nvSpPr>
-        <p:spPr/>
-        <p:txBody>
-          <a:bodyPr/>
-          <a:lstStyle/>
-          <a:p>
-            <a:r>
-              <a:rPr lang="en-US" dirty="0"/>
-              <a:t>E-commerce is purchasing, selling and exchanging goods and services over internet.</a:t>
-            </a:r>
-          </a:p>
-          <a:p>
-            <a:r>
-              <a:rPr lang="en-US" dirty="0"/>
-              <a:t>The main purpose of e-commerce site is that any person can buy as well as sell products.</a:t>
-            </a:r>
-          </a:p>
-        </p:txBody>
-      </p:sp>
-    </p:spTree>
-    <p:extLst>
-      <p:ext uri="{BB962C8B-B14F-4D97-AF65-F5344CB8AC3E}">
-        <p14:creationId xmlns:p14="http://schemas.microsoft.com/office/powerpoint/2010/main" val="2739682461"/>
       </p:ext>
     </p:extLst>
   </p:cSld>
@@ -36318,6 +37384,116 @@
           <p:cNvPr id="2" name="Title 1">
             <a:extLst>
               <a:ext uri="{FF2B5EF4-FFF2-40B4-BE49-F238E27FC236}">
+                <a16:creationId xmlns:a16="http://schemas.microsoft.com/office/drawing/2014/main" id="{652837ED-87CB-41AA-9CFF-0C1253AFFD57}"/>
+              </a:ext>
+            </a:extLst>
+          </p:cNvPr>
+          <p:cNvSpPr>
+            <a:spLocks noGrp="1"/>
+          </p:cNvSpPr>
+          <p:nvPr>
+            <p:ph type="title"/>
+          </p:nvPr>
+        </p:nvSpPr>
+        <p:spPr/>
+        <p:txBody>
+          <a:bodyPr/>
+          <a:lstStyle/>
+          <a:p>
+            <a:r>
+              <a:rPr lang="en-US" dirty="0"/>
+              <a:t>Features</a:t>
+            </a:r>
+          </a:p>
+        </p:txBody>
+      </p:sp>
+      <p:sp>
+        <p:nvSpPr>
+          <p:cNvPr id="3" name="Content Placeholder 2">
+            <a:extLst>
+              <a:ext uri="{FF2B5EF4-FFF2-40B4-BE49-F238E27FC236}">
+                <a16:creationId xmlns:a16="http://schemas.microsoft.com/office/drawing/2014/main" id="{F15FC0AD-DBFD-4B00-AA36-48555A1D71F8}"/>
+              </a:ext>
+            </a:extLst>
+          </p:cNvPr>
+          <p:cNvSpPr>
+            <a:spLocks noGrp="1"/>
+          </p:cNvSpPr>
+          <p:nvPr>
+            <p:ph idx="1"/>
+          </p:nvPr>
+        </p:nvSpPr>
+        <p:spPr/>
+        <p:txBody>
+          <a:bodyPr/>
+          <a:lstStyle/>
+          <a:p>
+            <a:r>
+              <a:rPr lang="en-US" dirty="0"/>
+              <a:t>Shopping cart</a:t>
+            </a:r>
+          </a:p>
+          <a:p>
+            <a:r>
+              <a:rPr lang="en-US" dirty="0"/>
+              <a:t>Checkout system </a:t>
+            </a:r>
+          </a:p>
+          <a:p>
+            <a:r>
+              <a:rPr lang="en-US" dirty="0"/>
+              <a:t>Payment system </a:t>
+            </a:r>
+          </a:p>
+          <a:p>
+            <a:r>
+              <a:rPr lang="en-US" dirty="0"/>
+              <a:t>Searching product</a:t>
+            </a:r>
+          </a:p>
+          <a:p>
+            <a:r>
+              <a:rPr lang="en-US" dirty="0"/>
+              <a:t>Browse through store</a:t>
+            </a:r>
+          </a:p>
+        </p:txBody>
+      </p:sp>
+    </p:spTree>
+    <p:extLst>
+      <p:ext uri="{BB962C8B-B14F-4D97-AF65-F5344CB8AC3E}">
+        <p14:creationId xmlns:p14="http://schemas.microsoft.com/office/powerpoint/2010/main" val="1970196382"/>
+      </p:ext>
+    </p:extLst>
+  </p:cSld>
+  <p:clrMapOvr>
+    <a:masterClrMapping/>
+  </p:clrMapOvr>
+</p:sld>
+</file>
+
+<file path=ppt/slides/slide5.xml><?xml version="1.0" encoding="utf-8"?>
+<p:sld xmlns:a="http://schemas.openxmlformats.org/drawingml/2006/main" xmlns:r="http://schemas.openxmlformats.org/officeDocument/2006/relationships" xmlns:p="http://schemas.openxmlformats.org/presentationml/2006/main">
+  <p:cSld>
+    <p:spTree>
+      <p:nvGrpSpPr>
+        <p:cNvPr id="1" name=""/>
+        <p:cNvGrpSpPr/>
+        <p:nvPr/>
+      </p:nvGrpSpPr>
+      <p:grpSpPr>
+        <a:xfrm>
+          <a:off x="0" y="0"/>
+          <a:ext cx="0" cy="0"/>
+          <a:chOff x="0" y="0"/>
+          <a:chExt cx="0" cy="0"/>
+        </a:xfrm>
+      </p:grpSpPr>
+      <p:sp>
+        <p:nvSpPr>
+          <p:cNvPr id="2" name="Title 1">
+            <a:extLst>
+              <a:ext uri="{FF2B5EF4-FFF2-40B4-BE49-F238E27FC236}">
                 <a16:creationId xmlns:a16="http://schemas.microsoft.com/office/drawing/2014/main" id="{21124785-B95B-406A-89D9-3F4BF7C63648}"/>
               </a:ext>
             </a:extLst>
@@ -36394,7 +37570,7 @@
 </p:sld>
 </file>
 
-<file path=ppt/slides/slide5.xml><?xml version="1.0" encoding="utf-8"?>
+<file path=ppt/slides/slide6.xml><?xml version="1.0" encoding="utf-8"?>
 <p:sld xmlns:a="http://schemas.openxmlformats.org/drawingml/2006/main" xmlns:r="http://schemas.openxmlformats.org/officeDocument/2006/relationships" xmlns:p="http://schemas.openxmlformats.org/presentationml/2006/main">
   <p:cSld>
     <p:spTree>
@@ -36486,115 +37662,6 @@
     <p:extLst>
       <p:ext uri="{BB962C8B-B14F-4D97-AF65-F5344CB8AC3E}">
         <p14:creationId xmlns:p14="http://schemas.microsoft.com/office/powerpoint/2010/main" val="1566591253"/>
-      </p:ext>
-    </p:extLst>
-  </p:cSld>
-  <p:clrMapOvr>
-    <a:masterClrMapping/>
-  </p:clrMapOvr>
-</p:sld>
-</file>
-
-<file path=ppt/slides/slide6.xml><?xml version="1.0" encoding="utf-8"?>
-<p:sld xmlns:a="http://schemas.openxmlformats.org/drawingml/2006/main" xmlns:r="http://schemas.openxmlformats.org/officeDocument/2006/relationships" xmlns:p="http://schemas.openxmlformats.org/presentationml/2006/main">
-  <p:cSld>
-    <p:spTree>
-      <p:nvGrpSpPr>
-        <p:cNvPr id="1" name=""/>
-        <p:cNvGrpSpPr/>
-        <p:nvPr/>
-      </p:nvGrpSpPr>
-      <p:grpSpPr>
-        <a:xfrm>
-          <a:off x="0" y="0"/>
-          <a:ext cx="0" cy="0"/>
-          <a:chOff x="0" y="0"/>
-          <a:chExt cx="0" cy="0"/>
-        </a:xfrm>
-      </p:grpSpPr>
-      <p:sp>
-        <p:nvSpPr>
-          <p:cNvPr id="2" name="Title 1">
-            <a:extLst>
-              <a:ext uri="{FF2B5EF4-FFF2-40B4-BE49-F238E27FC236}">
-                <a16:creationId xmlns:a16="http://schemas.microsoft.com/office/drawing/2014/main" id="{E2F91319-3C0A-4924-AAC2-B4AD0F6AFBD9}"/>
-              </a:ext>
-            </a:extLst>
-          </p:cNvPr>
-          <p:cNvSpPr>
-            <a:spLocks noGrp="1"/>
-          </p:cNvSpPr>
-          <p:nvPr>
-            <p:ph type="title"/>
-          </p:nvPr>
-        </p:nvSpPr>
-        <p:spPr/>
-        <p:txBody>
-          <a:bodyPr/>
-          <a:lstStyle/>
-          <a:p>
-            <a:r>
-              <a:rPr lang="en-US" dirty="0"/>
-              <a:t>Unit Testing</a:t>
-            </a:r>
-          </a:p>
-        </p:txBody>
-      </p:sp>
-      <p:sp>
-        <p:nvSpPr>
-          <p:cNvPr id="3" name="Content Placeholder 2">
-            <a:extLst>
-              <a:ext uri="{FF2B5EF4-FFF2-40B4-BE49-F238E27FC236}">
-                <a16:creationId xmlns:a16="http://schemas.microsoft.com/office/drawing/2014/main" id="{3496C24E-0E9B-4E4A-B827-5F95FE41A520}"/>
-              </a:ext>
-            </a:extLst>
-          </p:cNvPr>
-          <p:cNvSpPr>
-            <a:spLocks noGrp="1"/>
-          </p:cNvSpPr>
-          <p:nvPr>
-            <p:ph idx="1"/>
-          </p:nvPr>
-        </p:nvSpPr>
-        <p:spPr/>
-        <p:txBody>
-          <a:bodyPr/>
-          <a:lstStyle/>
-          <a:p>
-            <a:r>
-              <a:rPr lang="en-US" dirty="0"/>
-              <a:t>One test for one function.</a:t>
-            </a:r>
-          </a:p>
-          <a:p>
-            <a:r>
-              <a:rPr lang="en-US" dirty="0"/>
-              <a:t>Each method test one thing only.</a:t>
-            </a:r>
-          </a:p>
-          <a:p>
-            <a:r>
-              <a:rPr lang="en-US" dirty="0"/>
-              <a:t>Only one assert in one method.</a:t>
-            </a:r>
-          </a:p>
-          <a:p>
-            <a:r>
-              <a:rPr lang="en-US" dirty="0"/>
-              <a:t>Independent test. No data sharing </a:t>
-            </a:r>
-            <a:r>
-              <a:rPr lang="en-US"/>
-              <a:t>between test.</a:t>
-            </a:r>
-            <a:endParaRPr lang="en-US" dirty="0"/>
-          </a:p>
-        </p:txBody>
-      </p:sp>
-    </p:spTree>
-    <p:extLst>
-      <p:ext uri="{BB962C8B-B14F-4D97-AF65-F5344CB8AC3E}">
-        <p14:creationId xmlns:p14="http://schemas.microsoft.com/office/powerpoint/2010/main" val="1800858415"/>
       </p:ext>
     </p:extLst>
   </p:cSld>

</xml_diff>

<commit_message>
Order, store, seeder and style was done
</commit_message>
<xml_diff>
--- a/E-commerce site.pptx
+++ b/E-commerce site.pptx
@@ -7,28 +7,31 @@
   <p:sldIdLst>
     <p:sldId id="256" r:id="rId2"/>
     <p:sldId id="257" r:id="rId3"/>
-    <p:sldId id="258" r:id="rId4"/>
-    <p:sldId id="271" r:id="rId5"/>
-    <p:sldId id="259" r:id="rId6"/>
-    <p:sldId id="260" r:id="rId7"/>
-    <p:sldId id="263" r:id="rId8"/>
+    <p:sldId id="280" r:id="rId4"/>
+    <p:sldId id="258" r:id="rId5"/>
+    <p:sldId id="271" r:id="rId6"/>
+    <p:sldId id="263" r:id="rId7"/>
+    <p:sldId id="281" r:id="rId8"/>
     <p:sldId id="264" r:id="rId9"/>
     <p:sldId id="265" r:id="rId10"/>
-    <p:sldId id="266" r:id="rId11"/>
-    <p:sldId id="267" r:id="rId12"/>
-    <p:sldId id="272" r:id="rId13"/>
-    <p:sldId id="275" r:id="rId14"/>
-    <p:sldId id="276" r:id="rId15"/>
-    <p:sldId id="270" r:id="rId16"/>
-    <p:sldId id="277" r:id="rId17"/>
-    <p:sldId id="278" r:id="rId18"/>
-    <p:sldId id="279" r:id="rId19"/>
-    <p:sldId id="273" r:id="rId20"/>
-    <p:sldId id="274" r:id="rId21"/>
-    <p:sldId id="268" r:id="rId22"/>
-    <p:sldId id="262" r:id="rId23"/>
-    <p:sldId id="269" r:id="rId24"/>
-    <p:sldId id="261" r:id="rId25"/>
+    <p:sldId id="284" r:id="rId11"/>
+    <p:sldId id="266" r:id="rId12"/>
+    <p:sldId id="267" r:id="rId13"/>
+    <p:sldId id="272" r:id="rId14"/>
+    <p:sldId id="275" r:id="rId15"/>
+    <p:sldId id="276" r:id="rId16"/>
+    <p:sldId id="270" r:id="rId17"/>
+    <p:sldId id="277" r:id="rId18"/>
+    <p:sldId id="278" r:id="rId19"/>
+    <p:sldId id="279" r:id="rId20"/>
+    <p:sldId id="273" r:id="rId21"/>
+    <p:sldId id="274" r:id="rId22"/>
+    <p:sldId id="268" r:id="rId23"/>
+    <p:sldId id="262" r:id="rId24"/>
+    <p:sldId id="282" r:id="rId25"/>
+    <p:sldId id="283" r:id="rId26"/>
+    <p:sldId id="269" r:id="rId27"/>
+    <p:sldId id="261" r:id="rId28"/>
   </p:sldIdLst>
   <p:sldSz cx="12192000" cy="6858000"/>
   <p:notesSz cx="6858000" cy="9144000"/>
@@ -21933,7 +21936,7 @@
           <a:p>
             <a:fld id="{1198AF43-E227-4145-B12F-23C8F8DE73CD}" type="datetimeFigureOut">
               <a:rPr lang="en-US" smtClean="0"/>
-              <a:t>4/2/2019</a:t>
+              <a:t>4/3/2019</a:t>
             </a:fld>
             <a:endParaRPr lang="en-US"/>
           </a:p>
@@ -22140,7 +22143,7 @@
           <a:p>
             <a:fld id="{1198AF43-E227-4145-B12F-23C8F8DE73CD}" type="datetimeFigureOut">
               <a:rPr lang="en-US" smtClean="0"/>
-              <a:t>4/2/2019</a:t>
+              <a:t>4/3/2019</a:t>
             </a:fld>
             <a:endParaRPr lang="en-US"/>
           </a:p>
@@ -22320,7 +22323,7 @@
           <a:p>
             <a:fld id="{1198AF43-E227-4145-B12F-23C8F8DE73CD}" type="datetimeFigureOut">
               <a:rPr lang="en-US" smtClean="0"/>
-              <a:t>4/2/2019</a:t>
+              <a:t>4/3/2019</a:t>
             </a:fld>
             <a:endParaRPr lang="en-US"/>
           </a:p>
@@ -22525,7 +22528,7 @@
           <a:p>
             <a:fld id="{1198AF43-E227-4145-B12F-23C8F8DE73CD}" type="datetimeFigureOut">
               <a:rPr lang="en-US" smtClean="0"/>
-              <a:t>4/2/2019</a:t>
+              <a:t>4/3/2019</a:t>
             </a:fld>
             <a:endParaRPr lang="en-US"/>
           </a:p>
@@ -31423,7 +31426,7 @@
           <a:p>
             <a:fld id="{1198AF43-E227-4145-B12F-23C8F8DE73CD}" type="datetimeFigureOut">
               <a:rPr lang="en-US" smtClean="0"/>
-              <a:t>4/2/2019</a:t>
+              <a:t>4/3/2019</a:t>
             </a:fld>
             <a:endParaRPr lang="en-US"/>
           </a:p>
@@ -31697,7 +31700,7 @@
           <a:p>
             <a:fld id="{1198AF43-E227-4145-B12F-23C8F8DE73CD}" type="datetimeFigureOut">
               <a:rPr lang="en-US" smtClean="0"/>
-              <a:t>4/2/2019</a:t>
+              <a:t>4/3/2019</a:t>
             </a:fld>
             <a:endParaRPr lang="en-US"/>
           </a:p>
@@ -32095,7 +32098,7 @@
           <a:p>
             <a:fld id="{1198AF43-E227-4145-B12F-23C8F8DE73CD}" type="datetimeFigureOut">
               <a:rPr lang="en-US" smtClean="0"/>
-              <a:t>4/2/2019</a:t>
+              <a:t>4/3/2019</a:t>
             </a:fld>
             <a:endParaRPr lang="en-US"/>
           </a:p>
@@ -32213,7 +32216,7 @@
           <a:p>
             <a:fld id="{1198AF43-E227-4145-B12F-23C8F8DE73CD}" type="datetimeFigureOut">
               <a:rPr lang="en-US" smtClean="0"/>
-              <a:t>4/2/2019</a:t>
+              <a:t>4/3/2019</a:t>
             </a:fld>
             <a:endParaRPr lang="en-US"/>
           </a:p>
@@ -32308,7 +32311,7 @@
           <a:p>
             <a:fld id="{1198AF43-E227-4145-B12F-23C8F8DE73CD}" type="datetimeFigureOut">
               <a:rPr lang="en-US" smtClean="0"/>
-              <a:t>4/2/2019</a:t>
+              <a:t>4/3/2019</a:t>
             </a:fld>
             <a:endParaRPr lang="en-US"/>
           </a:p>
@@ -32598,7 +32601,7 @@
           <a:p>
             <a:fld id="{1198AF43-E227-4145-B12F-23C8F8DE73CD}" type="datetimeFigureOut">
               <a:rPr lang="en-US" smtClean="0"/>
-              <a:t>4/2/2019</a:t>
+              <a:t>4/3/2019</a:t>
             </a:fld>
             <a:endParaRPr lang="en-US"/>
           </a:p>
@@ -32878,7 +32881,7 @@
           <a:p>
             <a:fld id="{1198AF43-E227-4145-B12F-23C8F8DE73CD}" type="datetimeFigureOut">
               <a:rPr lang="en-US" smtClean="0"/>
-              <a:t>4/2/2019</a:t>
+              <a:t>4/3/2019</a:t>
             </a:fld>
             <a:endParaRPr lang="en-US"/>
           </a:p>
@@ -33128,7 +33131,7 @@
           <a:p>
             <a:fld id="{1198AF43-E227-4145-B12F-23C8F8DE73CD}" type="datetimeFigureOut">
               <a:rPr lang="en-US" smtClean="0"/>
-              <a:t>4/2/2019</a:t>
+              <a:t>4/3/2019</a:t>
             </a:fld>
             <a:endParaRPr lang="en-US"/>
           </a:p>
@@ -33961,6 +33964,116 @@
 <file path=ppt/slides/slide10.xml><?xml version="1.0" encoding="utf-8"?>
 <p:sld xmlns:a="http://schemas.openxmlformats.org/drawingml/2006/main" xmlns:r="http://schemas.openxmlformats.org/officeDocument/2006/relationships" xmlns:p="http://schemas.openxmlformats.org/presentationml/2006/main">
   <p:cSld>
+    <p:spTree>
+      <p:nvGrpSpPr>
+        <p:cNvPr id="1" name=""/>
+        <p:cNvGrpSpPr/>
+        <p:nvPr/>
+      </p:nvGrpSpPr>
+      <p:grpSpPr>
+        <a:xfrm>
+          <a:off x="0" y="0"/>
+          <a:ext cx="0" cy="0"/>
+          <a:chOff x="0" y="0"/>
+          <a:chExt cx="0" cy="0"/>
+        </a:xfrm>
+      </p:grpSpPr>
+      <p:sp>
+        <p:nvSpPr>
+          <p:cNvPr id="2" name="Title 1">
+            <a:extLst>
+              <a:ext uri="{FF2B5EF4-FFF2-40B4-BE49-F238E27FC236}">
+                <a16:creationId xmlns:a16="http://schemas.microsoft.com/office/drawing/2014/main" id="{F3F916B7-D2EA-4C9F-8063-F0F8AE35D227}"/>
+              </a:ext>
+            </a:extLst>
+          </p:cNvPr>
+          <p:cNvSpPr>
+            <a:spLocks noGrp="1"/>
+          </p:cNvSpPr>
+          <p:nvPr>
+            <p:ph type="title"/>
+          </p:nvPr>
+        </p:nvSpPr>
+        <p:spPr/>
+        <p:txBody>
+          <a:bodyPr/>
+          <a:lstStyle/>
+          <a:p>
+            <a:r>
+              <a:rPr lang="en-US" dirty="0"/>
+              <a:t>Waterfall Methodology</a:t>
+            </a:r>
+          </a:p>
+        </p:txBody>
+      </p:sp>
+      <p:sp>
+        <p:nvSpPr>
+          <p:cNvPr id="3" name="Content Placeholder 2">
+            <a:extLst>
+              <a:ext uri="{FF2B5EF4-FFF2-40B4-BE49-F238E27FC236}">
+                <a16:creationId xmlns:a16="http://schemas.microsoft.com/office/drawing/2014/main" id="{A072103D-268A-44A8-9E10-B9DB93A104A6}"/>
+              </a:ext>
+            </a:extLst>
+          </p:cNvPr>
+          <p:cNvSpPr>
+            <a:spLocks noGrp="1"/>
+          </p:cNvSpPr>
+          <p:nvPr>
+            <p:ph idx="1"/>
+          </p:nvPr>
+        </p:nvSpPr>
+        <p:spPr/>
+        <p:txBody>
+          <a:bodyPr/>
+          <a:lstStyle/>
+          <a:p>
+            <a:pPr marL="0" indent="0">
+              <a:buNone/>
+            </a:pPr>
+            <a:r>
+              <a:rPr lang="en-US" dirty="0"/>
+              <a:t>The waterfall methodology was used because of following reasons:</a:t>
+            </a:r>
+          </a:p>
+          <a:p>
+            <a:r>
+              <a:rPr lang="en-US" dirty="0"/>
+              <a:t>It is simple and easy to understand.</a:t>
+            </a:r>
+          </a:p>
+          <a:p>
+            <a:r>
+              <a:rPr lang="en-US" dirty="0"/>
+              <a:t>Progress of my project can be tracked easily.</a:t>
+            </a:r>
+          </a:p>
+          <a:p>
+            <a:r>
+              <a:rPr lang="en-US" dirty="0"/>
+              <a:t>My project has clear requirement, so I think waterfall model is suitable for my project.</a:t>
+            </a:r>
+          </a:p>
+          <a:p>
+            <a:endParaRPr lang="en-US" dirty="0"/>
+          </a:p>
+        </p:txBody>
+      </p:sp>
+    </p:spTree>
+    <p:extLst>
+      <p:ext uri="{BB962C8B-B14F-4D97-AF65-F5344CB8AC3E}">
+        <p14:creationId xmlns:p14="http://schemas.microsoft.com/office/powerpoint/2010/main" val="826034186"/>
+      </p:ext>
+    </p:extLst>
+  </p:cSld>
+  <p:clrMapOvr>
+    <a:masterClrMapping/>
+  </p:clrMapOvr>
+</p:sld>
+</file>
+
+<file path=ppt/slides/slide11.xml><?xml version="1.0" encoding="utf-8"?>
+<p:sld xmlns:a="http://schemas.openxmlformats.org/drawingml/2006/main" xmlns:r="http://schemas.openxmlformats.org/officeDocument/2006/relationships" xmlns:p="http://schemas.openxmlformats.org/presentationml/2006/main">
+  <p:cSld>
     <p:bg>
       <p:bgPr>
         <a:solidFill>
@@ -34012,18 +34125,13 @@
           <a:lstStyle/>
           <a:p>
             <a:r>
-              <a:rPr lang="en-US">
+              <a:rPr lang="en-US" dirty="0">
                 <a:solidFill>
                   <a:srgbClr val="000000"/>
                 </a:solidFill>
               </a:rPr>
               <a:t>3-tier architecture</a:t>
             </a:r>
-            <a:endParaRPr lang="en-US" dirty="0">
-              <a:solidFill>
-                <a:srgbClr val="000000"/>
-              </a:solidFill>
-            </a:endParaRPr>
           </a:p>
         </p:txBody>
       </p:sp>
@@ -34045,8 +34153,8 @@
         </p:nvSpPr>
         <p:spPr>
           <a:xfrm>
-            <a:off x="6090574" y="2421682"/>
-            <a:ext cx="4977578" cy="3639289"/>
+            <a:off x="6103675" y="2113014"/>
+            <a:ext cx="4415561" cy="2631971"/>
           </a:xfrm>
         </p:spPr>
         <p:txBody>
@@ -34056,7 +34164,7 @@
           <a:lstStyle/>
           <a:p>
             <a:r>
-              <a:rPr lang="en-US" sz="2000">
+              <a:rPr lang="en-US" sz="2000" dirty="0">
                 <a:solidFill>
                   <a:srgbClr val="000000"/>
                 </a:solidFill>
@@ -34066,7 +34174,7 @@
           </a:p>
           <a:p>
             <a:r>
-              <a:rPr lang="en-US" sz="2000">
+              <a:rPr lang="en-US" sz="2000" dirty="0">
                 <a:solidFill>
                   <a:srgbClr val="000000"/>
                 </a:solidFill>
@@ -34076,18 +34184,13 @@
           </a:p>
           <a:p>
             <a:r>
-              <a:rPr lang="en-US" sz="2000">
+              <a:rPr lang="en-US" sz="2000" dirty="0">
                 <a:solidFill>
                   <a:srgbClr val="000000"/>
                 </a:solidFill>
               </a:rPr>
               <a:t>Data tier</a:t>
             </a:r>
-            <a:endParaRPr lang="en-US" sz="2000" dirty="0">
-              <a:solidFill>
-                <a:srgbClr val="000000"/>
-              </a:solidFill>
-            </a:endParaRPr>
           </a:p>
         </p:txBody>
       </p:sp>
@@ -34119,7 +34222,7 @@
         </p:blipFill>
         <p:spPr bwMode="auto">
           <a:xfrm>
-            <a:off x="46091" y="2287956"/>
+            <a:off x="523169" y="2287956"/>
             <a:ext cx="4754880" cy="1953370"/>
           </a:xfrm>
           <a:prstGeom prst="rect">
@@ -34141,7 +34244,7 @@
 </p:sld>
 </file>
 
-<file path=ppt/slides/slide11.xml><?xml version="1.0" encoding="utf-8"?>
+<file path=ppt/slides/slide12.xml><?xml version="1.0" encoding="utf-8"?>
 <p:sld xmlns:a="http://schemas.openxmlformats.org/drawingml/2006/main" xmlns:r="http://schemas.openxmlformats.org/officeDocument/2006/relationships" xmlns:p="http://schemas.openxmlformats.org/presentationml/2006/main">
   <p:cSld>
     <p:spTree>
@@ -34202,14 +34305,14 @@
             <p:ph idx="1"/>
             <p:extLst>
               <p:ext uri="{D42A27DB-BD31-4B8C-83A1-F6EECF244321}">
-                <p14:modId xmlns:p14="http://schemas.microsoft.com/office/powerpoint/2010/main" val="345618054"/>
+                <p14:modId xmlns:p14="http://schemas.microsoft.com/office/powerpoint/2010/main" val="279745486"/>
               </p:ext>
             </p:extLst>
           </p:nvPr>
         </p:nvGraphicFramePr>
         <p:xfrm>
-          <a:off x="768627" y="2279373"/>
-          <a:ext cx="8958469" cy="4465981"/>
+          <a:off x="1166191" y="2557852"/>
+          <a:ext cx="8481391" cy="4061301"/>
         </p:xfrm>
         <a:graphic>
           <a:graphicData uri="http://schemas.openxmlformats.org/drawingml/2006/table">
@@ -34218,42 +34321,42 @@
                 <a:tableStyleId>{5C22544A-7EE6-4342-B048-85BDC9FD1C3A}</a:tableStyleId>
               </a:tblPr>
               <a:tblGrid>
-                <a:gridCol w="490210">
+                <a:gridCol w="464104">
                   <a:extLst>
                     <a:ext uri="{9D8B030D-6E8A-4147-A177-3AD203B41FA5}">
                       <a16:colId xmlns:a16="http://schemas.microsoft.com/office/drawing/2014/main" val="3359599394"/>
                     </a:ext>
                   </a:extLst>
                 </a:gridCol>
-                <a:gridCol w="1722429">
+                <a:gridCol w="1630702">
                   <a:extLst>
                     <a:ext uri="{9D8B030D-6E8A-4147-A177-3AD203B41FA5}">
                       <a16:colId xmlns:a16="http://schemas.microsoft.com/office/drawing/2014/main" val="350447027"/>
                     </a:ext>
                   </a:extLst>
                 </a:gridCol>
-                <a:gridCol w="1070767">
+                <a:gridCol w="1013744">
                   <a:extLst>
                     <a:ext uri="{9D8B030D-6E8A-4147-A177-3AD203B41FA5}">
                       <a16:colId xmlns:a16="http://schemas.microsoft.com/office/drawing/2014/main" val="234591918"/>
                     </a:ext>
                   </a:extLst>
                 </a:gridCol>
-                <a:gridCol w="1542573">
+                <a:gridCol w="1460424">
                   <a:extLst>
                     <a:ext uri="{9D8B030D-6E8A-4147-A177-3AD203B41FA5}">
                       <a16:colId xmlns:a16="http://schemas.microsoft.com/office/drawing/2014/main" val="2031173088"/>
                     </a:ext>
                   </a:extLst>
                 </a:gridCol>
-                <a:gridCol w="820642">
+                <a:gridCol w="776939">
                   <a:extLst>
                     <a:ext uri="{9D8B030D-6E8A-4147-A177-3AD203B41FA5}">
                       <a16:colId xmlns:a16="http://schemas.microsoft.com/office/drawing/2014/main" val="242123310"/>
                     </a:ext>
                   </a:extLst>
                 </a:gridCol>
-                <a:gridCol w="3311848">
+                <a:gridCol w="3135478">
                   <a:extLst>
                     <a:ext uri="{9D8B030D-6E8A-4147-A177-3AD203B41FA5}">
                       <a16:colId xmlns:a16="http://schemas.microsoft.com/office/drawing/2014/main" val="1067992769"/>
@@ -34261,7 +34364,7 @@
                   </a:extLst>
                 </a:gridCol>
               </a:tblGrid>
-              <a:tr h="481496">
+              <a:tr h="543339">
                 <a:tc>
                   <a:txBody>
                     <a:bodyPr/>
@@ -34442,7 +34545,7 @@
                   </a:ext>
                 </a:extLst>
               </a:tr>
-              <a:tr h="686167">
+              <a:tr h="604723">
                 <a:tc>
                   <a:txBody>
                     <a:bodyPr/>
@@ -34575,12 +34678,12 @@
                         </a:spcAft>
                       </a:pPr>
                       <a:r>
-                        <a:rPr lang="en-US" sz="1200" kern="100">
+                        <a:rPr lang="en-US" sz="1200" kern="100" dirty="0">
                           <a:effectLst/>
                         </a:rPr>
                         <a:t>6</a:t>
                       </a:r>
-                      <a:endParaRPr lang="en-US" sz="1100" kern="100">
+                      <a:endParaRPr lang="en-US" sz="1100" kern="100" dirty="0">
                         <a:effectLst/>
                         <a:latin typeface="Liberation Serif"/>
                         <a:ea typeface="Noto Serif CJK SC"/>
@@ -34625,7 +34728,7 @@
                   </a:ext>
                 </a:extLst>
               </a:tr>
-              <a:tr h="481496">
+              <a:tr h="424345">
                 <a:tc>
                   <a:txBody>
                     <a:bodyPr/>
@@ -34758,12 +34861,12 @@
                         </a:spcAft>
                       </a:pPr>
                       <a:r>
-                        <a:rPr lang="en-US" sz="1200" kern="100">
+                        <a:rPr lang="en-US" sz="1200" kern="100" dirty="0">
                           <a:effectLst/>
                         </a:rPr>
                         <a:t>12</a:t>
                       </a:r>
-                      <a:endParaRPr lang="en-US" sz="1100" kern="100">
+                      <a:endParaRPr lang="en-US" sz="1100" kern="100" dirty="0">
                         <a:effectLst/>
                         <a:latin typeface="Liberation Serif"/>
                         <a:ea typeface="Noto Serif CJK SC"/>
@@ -34808,7 +34911,7 @@
                   </a:ext>
                 </a:extLst>
               </a:tr>
-              <a:tr h="481496">
+              <a:tr h="424345">
                 <a:tc>
                   <a:txBody>
                     <a:bodyPr/>
@@ -34941,12 +35044,12 @@
                         </a:spcAft>
                       </a:pPr>
                       <a:r>
-                        <a:rPr lang="en-US" sz="1200" kern="100">
+                        <a:rPr lang="en-US" sz="1200" kern="100" dirty="0">
                           <a:effectLst/>
                         </a:rPr>
                         <a:t>12</a:t>
                       </a:r>
-                      <a:endParaRPr lang="en-US" sz="1100" kern="100">
+                      <a:endParaRPr lang="en-US" sz="1100" kern="100" dirty="0">
                         <a:effectLst/>
                         <a:latin typeface="Liberation Serif"/>
                         <a:ea typeface="Noto Serif CJK SC"/>
@@ -34991,7 +35094,7 @@
                   </a:ext>
                 </a:extLst>
               </a:tr>
-              <a:tr h="481496">
+              <a:tr h="424345">
                 <a:tc>
                   <a:txBody>
                     <a:bodyPr/>
@@ -35177,7 +35280,7 @@
                   </a:ext>
                 </a:extLst>
               </a:tr>
-              <a:tr h="686167">
+              <a:tr h="604723">
                 <a:tc>
                   <a:txBody>
                     <a:bodyPr/>
@@ -35360,7 +35463,7 @@
                   </a:ext>
                 </a:extLst>
               </a:tr>
-              <a:tr h="481496">
+              <a:tr h="424345">
                 <a:tc>
                   <a:txBody>
                     <a:bodyPr/>
@@ -35543,7 +35646,7 @@
                   </a:ext>
                 </a:extLst>
               </a:tr>
-              <a:tr h="686167">
+              <a:tr h="604723">
                 <a:tc>
                   <a:txBody>
                     <a:bodyPr/>
@@ -35730,6 +35833,42 @@
           </a:graphicData>
         </a:graphic>
       </p:graphicFrame>
+      <p:sp>
+        <p:nvSpPr>
+          <p:cNvPr id="3" name="TextBox 2">
+            <a:extLst>
+              <a:ext uri="{FF2B5EF4-FFF2-40B4-BE49-F238E27FC236}">
+                <a16:creationId xmlns:a16="http://schemas.microsoft.com/office/drawing/2014/main" id="{594910ED-EB81-470E-B053-D2876535BDEF}"/>
+              </a:ext>
+            </a:extLst>
+          </p:cNvPr>
+          <p:cNvSpPr txBox="1"/>
+          <p:nvPr/>
+        </p:nvSpPr>
+        <p:spPr>
+          <a:xfrm>
+            <a:off x="1166191" y="1900166"/>
+            <a:ext cx="3666388" cy="369332"/>
+          </a:xfrm>
+          <a:prstGeom prst="rect">
+            <a:avLst/>
+          </a:prstGeom>
+          <a:noFill/>
+        </p:spPr>
+        <p:txBody>
+          <a:bodyPr wrap="none" rtlCol="0">
+            <a:spAutoFit/>
+          </a:bodyPr>
+          <a:lstStyle/>
+          <a:p>
+            <a:r>
+              <a:rPr lang="en-US" b="1" dirty="0"/>
+              <a:t>Impact = Likelihood * Consequences</a:t>
+            </a:r>
+            <a:endParaRPr lang="en-US" dirty="0"/>
+          </a:p>
+        </p:txBody>
+      </p:sp>
     </p:spTree>
     <p:extLst>
       <p:ext uri="{BB962C8B-B14F-4D97-AF65-F5344CB8AC3E}">
@@ -35743,7 +35882,7 @@
 </p:sld>
 </file>
 
-<file path=ppt/slides/slide12.xml><?xml version="1.0" encoding="utf-8"?>
+<file path=ppt/slides/slide13.xml><?xml version="1.0" encoding="utf-8"?>
 <p:sld xmlns:a="http://schemas.openxmlformats.org/drawingml/2006/main" xmlns:r="http://schemas.openxmlformats.org/officeDocument/2006/relationships" xmlns:p="http://schemas.openxmlformats.org/presentationml/2006/main">
   <p:cSld>
     <p:spTree>
@@ -35809,17 +35948,61 @@
           <a:bodyPr/>
           <a:lstStyle/>
           <a:p>
+            <a:pPr marL="0" indent="0">
+              <a:buNone/>
+            </a:pPr>
+            <a:r>
+              <a:rPr lang="en-US" dirty="0"/>
+              <a:t>I used </a:t>
+            </a:r>
             <a:r>
               <a:rPr lang="en-US" dirty="0" err="1"/>
-              <a:t>Github</a:t>
+              <a:t>github</a:t>
             </a:r>
             <a:r>
               <a:rPr lang="en-US" dirty="0"/>
-              <a:t> was used to manage my project.</a:t>
+              <a:t> to keep track of my project.</a:t>
             </a:r>
+          </a:p>
+          <a:p>
+            <a:endParaRPr lang="en-US" dirty="0"/>
           </a:p>
         </p:txBody>
       </p:sp>
+      <p:pic>
+        <p:nvPicPr>
+          <p:cNvPr id="4" name="Picture 3">
+            <a:extLst>
+              <a:ext uri="{FF2B5EF4-FFF2-40B4-BE49-F238E27FC236}">
+                <a16:creationId xmlns:a16="http://schemas.microsoft.com/office/drawing/2014/main" id="{245D2D01-E8D5-40EB-8F4E-13D538449A8E}"/>
+              </a:ext>
+            </a:extLst>
+          </p:cNvPr>
+          <p:cNvPicPr/>
+          <p:nvPr/>
+        </p:nvPicPr>
+        <p:blipFill>
+          <a:blip r:embed="rId2">
+            <a:extLst>
+              <a:ext uri="{28A0092B-C50C-407E-A947-70E740481C1C}">
+                <a14:useLocalDpi xmlns:a14="http://schemas.microsoft.com/office/drawing/2010/main" val="0"/>
+              </a:ext>
+            </a:extLst>
+          </a:blip>
+          <a:stretch>
+            <a:fillRect/>
+          </a:stretch>
+        </p:blipFill>
+        <p:spPr>
+          <a:xfrm>
+            <a:off x="1127594" y="2851150"/>
+            <a:ext cx="7298954" cy="3802868"/>
+          </a:xfrm>
+          <a:prstGeom prst="rect">
+            <a:avLst/>
+          </a:prstGeom>
+        </p:spPr>
+      </p:pic>
     </p:spTree>
     <p:extLst>
       <p:ext uri="{BB962C8B-B14F-4D97-AF65-F5344CB8AC3E}">
@@ -35833,7 +36016,7 @@
 </p:sld>
 </file>
 
-<file path=ppt/slides/slide13.xml><?xml version="1.0" encoding="utf-8"?>
+<file path=ppt/slides/slide14.xml><?xml version="1.0" encoding="utf-8"?>
 <p:sld xmlns:a="http://schemas.openxmlformats.org/drawingml/2006/main" xmlns:r="http://schemas.openxmlformats.org/officeDocument/2006/relationships" xmlns:p="http://schemas.openxmlformats.org/presentationml/2006/main">
   <p:cSld>
     <p:spTree>
@@ -35908,8 +36091,8 @@
         </p:blipFill>
         <p:spPr>
           <a:xfrm>
-            <a:off x="1984322" y="1916020"/>
-            <a:ext cx="5795111" cy="4580007"/>
+            <a:off x="1984322" y="2326916"/>
+            <a:ext cx="6033243" cy="3758215"/>
           </a:xfrm>
         </p:spPr>
       </p:pic>
@@ -35926,7 +36109,7 @@
 </p:sld>
 </file>
 
-<file path=ppt/slides/slide14.xml><?xml version="1.0" encoding="utf-8"?>
+<file path=ppt/slides/slide15.xml><?xml version="1.0" encoding="utf-8"?>
 <p:sld xmlns:a="http://schemas.openxmlformats.org/drawingml/2006/main" xmlns:r="http://schemas.openxmlformats.org/officeDocument/2006/relationships" xmlns:p="http://schemas.openxmlformats.org/presentationml/2006/main">
   <p:cSld>
     <p:spTree>
@@ -36031,7 +36214,7 @@
 </p:sld>
 </file>
 
-<file path=ppt/slides/slide15.xml><?xml version="1.0" encoding="utf-8"?>
+<file path=ppt/slides/slide16.xml><?xml version="1.0" encoding="utf-8"?>
 <p:sld xmlns:a="http://schemas.openxmlformats.org/drawingml/2006/main" xmlns:r="http://schemas.openxmlformats.org/officeDocument/2006/relationships" xmlns:p="http://schemas.openxmlformats.org/presentationml/2006/main">
   <p:cSld>
     <p:bg>
@@ -36297,7 +36480,7 @@
 </p:sld>
 </file>
 
-<file path=ppt/slides/slide16.xml><?xml version="1.0" encoding="utf-8"?>
+<file path=ppt/slides/slide17.xml><?xml version="1.0" encoding="utf-8"?>
 <p:sld xmlns:a="http://schemas.openxmlformats.org/drawingml/2006/main" xmlns:r="http://schemas.openxmlformats.org/officeDocument/2006/relationships" xmlns:p="http://schemas.openxmlformats.org/presentationml/2006/main">
   <p:cSld>
     <p:spTree>
@@ -36335,7 +36518,10 @@
           <a:bodyPr/>
           <a:lstStyle/>
           <a:p>
-            <a:endParaRPr lang="en-US"/>
+            <a:r>
+              <a:rPr lang="en-US" dirty="0"/>
+              <a:t>Home page-code</a:t>
+            </a:r>
           </a:p>
         </p:txBody>
       </p:sp>
@@ -36387,7 +36573,7 @@
 </p:sld>
 </file>
 
-<file path=ppt/slides/slide17.xml><?xml version="1.0" encoding="utf-8"?>
+<file path=ppt/slides/slide18.xml><?xml version="1.0" encoding="utf-8"?>
 <p:sld xmlns:a="http://schemas.openxmlformats.org/drawingml/2006/main" xmlns:r="http://schemas.openxmlformats.org/officeDocument/2006/relationships" xmlns:p="http://schemas.openxmlformats.org/presentationml/2006/main">
   <p:cSld>
     <p:spTree>
@@ -36425,7 +36611,10 @@
           <a:bodyPr/>
           <a:lstStyle/>
           <a:p>
-            <a:endParaRPr lang="en-US"/>
+            <a:r>
+              <a:rPr lang="en-US" dirty="0"/>
+              <a:t>Product detail- design</a:t>
+            </a:r>
           </a:p>
         </p:txBody>
       </p:sp>
@@ -36477,7 +36666,7 @@
 </p:sld>
 </file>
 
-<file path=ppt/slides/slide18.xml><?xml version="1.0" encoding="utf-8"?>
+<file path=ppt/slides/slide19.xml><?xml version="1.0" encoding="utf-8"?>
 <p:sld xmlns:a="http://schemas.openxmlformats.org/drawingml/2006/main" xmlns:r="http://schemas.openxmlformats.org/officeDocument/2006/relationships" xmlns:p="http://schemas.openxmlformats.org/presentationml/2006/main">
   <p:cSld>
     <p:spTree>
@@ -36515,7 +36704,10 @@
           <a:bodyPr/>
           <a:lstStyle/>
           <a:p>
-            <a:endParaRPr lang="en-US"/>
+            <a:r>
+              <a:rPr lang="en-US" dirty="0"/>
+              <a:t>Product detail- code</a:t>
+            </a:r>
           </a:p>
         </p:txBody>
       </p:sp>
@@ -36567,7 +36759,99 @@
 </p:sld>
 </file>
 
-<file path=ppt/slides/slide19.xml><?xml version="1.0" encoding="utf-8"?>
+<file path=ppt/slides/slide2.xml><?xml version="1.0" encoding="utf-8"?>
+<p:sld xmlns:a="http://schemas.openxmlformats.org/drawingml/2006/main" xmlns:r="http://schemas.openxmlformats.org/officeDocument/2006/relationships" xmlns:p="http://schemas.openxmlformats.org/presentationml/2006/main">
+  <p:cSld>
+    <p:spTree>
+      <p:nvGrpSpPr>
+        <p:cNvPr id="1" name=""/>
+        <p:cNvGrpSpPr/>
+        <p:nvPr/>
+      </p:nvGrpSpPr>
+      <p:grpSpPr>
+        <a:xfrm>
+          <a:off x="0" y="0"/>
+          <a:ext cx="0" cy="0"/>
+          <a:chOff x="0" y="0"/>
+          <a:chExt cx="0" cy="0"/>
+        </a:xfrm>
+      </p:grpSpPr>
+      <p:sp>
+        <p:nvSpPr>
+          <p:cNvPr id="2" name="Title 1">
+            <a:extLst>
+              <a:ext uri="{FF2B5EF4-FFF2-40B4-BE49-F238E27FC236}">
+                <a16:creationId xmlns:a16="http://schemas.microsoft.com/office/drawing/2014/main" id="{9CF86A62-397A-4BF9-8AA2-EC3C5630EF09}"/>
+              </a:ext>
+            </a:extLst>
+          </p:cNvPr>
+          <p:cNvSpPr>
+            <a:spLocks noGrp="1"/>
+          </p:cNvSpPr>
+          <p:nvPr>
+            <p:ph type="title"/>
+          </p:nvPr>
+        </p:nvSpPr>
+        <p:spPr/>
+        <p:txBody>
+          <a:bodyPr/>
+          <a:lstStyle/>
+          <a:p>
+            <a:r>
+              <a:rPr lang="en-US" dirty="0"/>
+              <a:t>Introduction</a:t>
+            </a:r>
+          </a:p>
+        </p:txBody>
+      </p:sp>
+      <p:sp>
+        <p:nvSpPr>
+          <p:cNvPr id="3" name="Content Placeholder 2">
+            <a:extLst>
+              <a:ext uri="{FF2B5EF4-FFF2-40B4-BE49-F238E27FC236}">
+                <a16:creationId xmlns:a16="http://schemas.microsoft.com/office/drawing/2014/main" id="{2C497AAA-0146-4F14-BD53-51EE77328D50}"/>
+              </a:ext>
+            </a:extLst>
+          </p:cNvPr>
+          <p:cNvSpPr>
+            <a:spLocks noGrp="1"/>
+          </p:cNvSpPr>
+          <p:nvPr>
+            <p:ph idx="1"/>
+          </p:nvPr>
+        </p:nvSpPr>
+        <p:spPr/>
+        <p:txBody>
+          <a:bodyPr/>
+          <a:lstStyle/>
+          <a:p>
+            <a:r>
+              <a:rPr lang="en-US" dirty="0"/>
+              <a:t>E-commerce refers to the sale of goods or products through online Stores. </a:t>
+            </a:r>
+          </a:p>
+          <a:p>
+            <a:r>
+              <a:rPr lang="en-US" dirty="0"/>
+              <a:t>The main purpose of e-commerce site is that any person can buy as well as sell products.</a:t>
+            </a:r>
+          </a:p>
+        </p:txBody>
+      </p:sp>
+    </p:spTree>
+    <p:extLst>
+      <p:ext uri="{BB962C8B-B14F-4D97-AF65-F5344CB8AC3E}">
+        <p14:creationId xmlns:p14="http://schemas.microsoft.com/office/powerpoint/2010/main" val="2739682461"/>
+      </p:ext>
+    </p:extLst>
+  </p:cSld>
+  <p:clrMapOvr>
+    <a:masterClrMapping/>
+  </p:clrMapOvr>
+</p:sld>
+</file>
+
+<file path=ppt/slides/slide20.xml><?xml version="1.0" encoding="utf-8"?>
 <p:sld xmlns:a="http://schemas.openxmlformats.org/drawingml/2006/main" xmlns:r="http://schemas.openxmlformats.org/officeDocument/2006/relationships" xmlns:p="http://schemas.openxmlformats.org/presentationml/2006/main">
   <p:cSld>
     <p:spTree>
@@ -36660,99 +36944,7 @@
 </p:sld>
 </file>
 
-<file path=ppt/slides/slide2.xml><?xml version="1.0" encoding="utf-8"?>
-<p:sld xmlns:a="http://schemas.openxmlformats.org/drawingml/2006/main" xmlns:r="http://schemas.openxmlformats.org/officeDocument/2006/relationships" xmlns:p="http://schemas.openxmlformats.org/presentationml/2006/main">
-  <p:cSld>
-    <p:spTree>
-      <p:nvGrpSpPr>
-        <p:cNvPr id="1" name=""/>
-        <p:cNvGrpSpPr/>
-        <p:nvPr/>
-      </p:nvGrpSpPr>
-      <p:grpSpPr>
-        <a:xfrm>
-          <a:off x="0" y="0"/>
-          <a:ext cx="0" cy="0"/>
-          <a:chOff x="0" y="0"/>
-          <a:chExt cx="0" cy="0"/>
-        </a:xfrm>
-      </p:grpSpPr>
-      <p:sp>
-        <p:nvSpPr>
-          <p:cNvPr id="2" name="Title 1">
-            <a:extLst>
-              <a:ext uri="{FF2B5EF4-FFF2-40B4-BE49-F238E27FC236}">
-                <a16:creationId xmlns:a16="http://schemas.microsoft.com/office/drawing/2014/main" id="{9CF86A62-397A-4BF9-8AA2-EC3C5630EF09}"/>
-              </a:ext>
-            </a:extLst>
-          </p:cNvPr>
-          <p:cNvSpPr>
-            <a:spLocks noGrp="1"/>
-          </p:cNvSpPr>
-          <p:nvPr>
-            <p:ph type="title"/>
-          </p:nvPr>
-        </p:nvSpPr>
-        <p:spPr/>
-        <p:txBody>
-          <a:bodyPr/>
-          <a:lstStyle/>
-          <a:p>
-            <a:r>
-              <a:rPr lang="en-US" dirty="0"/>
-              <a:t>Introduction</a:t>
-            </a:r>
-          </a:p>
-        </p:txBody>
-      </p:sp>
-      <p:sp>
-        <p:nvSpPr>
-          <p:cNvPr id="3" name="Content Placeholder 2">
-            <a:extLst>
-              <a:ext uri="{FF2B5EF4-FFF2-40B4-BE49-F238E27FC236}">
-                <a16:creationId xmlns:a16="http://schemas.microsoft.com/office/drawing/2014/main" id="{2C497AAA-0146-4F14-BD53-51EE77328D50}"/>
-              </a:ext>
-            </a:extLst>
-          </p:cNvPr>
-          <p:cNvSpPr>
-            <a:spLocks noGrp="1"/>
-          </p:cNvSpPr>
-          <p:nvPr>
-            <p:ph idx="1"/>
-          </p:nvPr>
-        </p:nvSpPr>
-        <p:spPr/>
-        <p:txBody>
-          <a:bodyPr/>
-          <a:lstStyle/>
-          <a:p>
-            <a:r>
-              <a:rPr lang="en-US" dirty="0"/>
-              <a:t>E-commerce is purchasing, selling and exchanging goods and services over internet.</a:t>
-            </a:r>
-          </a:p>
-          <a:p>
-            <a:r>
-              <a:rPr lang="en-US" dirty="0"/>
-              <a:t>The main purpose of e-commerce site is that any person can buy as well as sell products.</a:t>
-            </a:r>
-          </a:p>
-        </p:txBody>
-      </p:sp>
-    </p:spTree>
-    <p:extLst>
-      <p:ext uri="{BB962C8B-B14F-4D97-AF65-F5344CB8AC3E}">
-        <p14:creationId xmlns:p14="http://schemas.microsoft.com/office/powerpoint/2010/main" val="2739682461"/>
-      </p:ext>
-    </p:extLst>
-  </p:cSld>
-  <p:clrMapOvr>
-    <a:masterClrMapping/>
-  </p:clrMapOvr>
-</p:sld>
-</file>
-
-<file path=ppt/slides/slide20.xml><?xml version="1.0" encoding="utf-8"?>
+<file path=ppt/slides/slide21.xml><?xml version="1.0" encoding="utf-8"?>
 <p:sld xmlns:a="http://schemas.openxmlformats.org/drawingml/2006/main" xmlns:r="http://schemas.openxmlformats.org/officeDocument/2006/relationships" xmlns:p="http://schemas.openxmlformats.org/presentationml/2006/main">
   <p:cSld>
     <p:spTree>
@@ -36845,7 +37037,7 @@
 </p:sld>
 </file>
 
-<file path=ppt/slides/slide21.xml><?xml version="1.0" encoding="utf-8"?>
+<file path=ppt/slides/slide22.xml><?xml version="1.0" encoding="utf-8"?>
 <p:sld xmlns:a="http://schemas.openxmlformats.org/drawingml/2006/main" xmlns:r="http://schemas.openxmlformats.org/officeDocument/2006/relationships" xmlns:p="http://schemas.openxmlformats.org/presentationml/2006/main">
   <p:cSld>
     <p:spTree>
@@ -36949,7 +37141,7 @@
 </p:sld>
 </file>
 
-<file path=ppt/slides/slide22.xml><?xml version="1.0" encoding="utf-8"?>
+<file path=ppt/slides/slide23.xml><?xml version="1.0" encoding="utf-8"?>
 <p:sld xmlns:a="http://schemas.openxmlformats.org/drawingml/2006/main" xmlns:r="http://schemas.openxmlformats.org/officeDocument/2006/relationships" xmlns:p="http://schemas.openxmlformats.org/presentationml/2006/main">
   <p:cSld>
     <p:spTree>
@@ -37058,7 +37250,1169 @@
 </p:sld>
 </file>
 
-<file path=ppt/slides/slide23.xml><?xml version="1.0" encoding="utf-8"?>
+<file path=ppt/slides/slide24.xml><?xml version="1.0" encoding="utf-8"?>
+<p:sld xmlns:a="http://schemas.openxmlformats.org/drawingml/2006/main" xmlns:r="http://schemas.openxmlformats.org/officeDocument/2006/relationships" xmlns:p="http://schemas.openxmlformats.org/presentationml/2006/main">
+  <p:cSld>
+    <p:spTree>
+      <p:nvGrpSpPr>
+        <p:cNvPr id="1" name=""/>
+        <p:cNvGrpSpPr/>
+        <p:nvPr/>
+      </p:nvGrpSpPr>
+      <p:grpSpPr>
+        <a:xfrm>
+          <a:off x="0" y="0"/>
+          <a:ext cx="0" cy="0"/>
+          <a:chOff x="0" y="0"/>
+          <a:chExt cx="0" cy="0"/>
+        </a:xfrm>
+      </p:grpSpPr>
+      <p:sp>
+        <p:nvSpPr>
+          <p:cNvPr id="2" name="Title 1">
+            <a:extLst>
+              <a:ext uri="{FF2B5EF4-FFF2-40B4-BE49-F238E27FC236}">
+                <a16:creationId xmlns:a16="http://schemas.microsoft.com/office/drawing/2014/main" id="{CA484CFF-E2E7-4D4A-AB71-D5C918271EFB}"/>
+              </a:ext>
+            </a:extLst>
+          </p:cNvPr>
+          <p:cNvSpPr>
+            <a:spLocks noGrp="1"/>
+          </p:cNvSpPr>
+          <p:nvPr>
+            <p:ph type="title"/>
+          </p:nvPr>
+        </p:nvSpPr>
+        <p:spPr/>
+        <p:txBody>
+          <a:bodyPr/>
+          <a:lstStyle/>
+          <a:p>
+            <a:r>
+              <a:rPr lang="en-US" dirty="0"/>
+              <a:t>Test case 1</a:t>
+            </a:r>
+          </a:p>
+        </p:txBody>
+      </p:sp>
+      <p:pic>
+        <p:nvPicPr>
+          <p:cNvPr id="4" name="Content Placeholder 3">
+            <a:extLst>
+              <a:ext uri="{FF2B5EF4-FFF2-40B4-BE49-F238E27FC236}">
+                <a16:creationId xmlns:a16="http://schemas.microsoft.com/office/drawing/2014/main" id="{E056DE75-303C-43C6-97F4-2157C3924AF6}"/>
+              </a:ext>
+            </a:extLst>
+          </p:cNvPr>
+          <p:cNvPicPr>
+            <a:picLocks noGrp="1"/>
+          </p:cNvPicPr>
+          <p:nvPr>
+            <p:ph idx="1"/>
+          </p:nvPr>
+        </p:nvPicPr>
+        <p:blipFill>
+          <a:blip r:embed="rId2">
+            <a:extLst>
+              <a:ext uri="{28A0092B-C50C-407E-A947-70E740481C1C}">
+                <a14:useLocalDpi xmlns:a14="http://schemas.microsoft.com/office/drawing/2010/main" val="0"/>
+              </a:ext>
+            </a:extLst>
+          </a:blip>
+          <a:stretch>
+            <a:fillRect/>
+          </a:stretch>
+        </p:blipFill>
+        <p:spPr>
+          <a:xfrm>
+            <a:off x="1024128" y="2266788"/>
+            <a:ext cx="3848637" cy="1162212"/>
+          </a:xfrm>
+          <a:prstGeom prst="rect">
+            <a:avLst/>
+          </a:prstGeom>
+        </p:spPr>
+      </p:pic>
+      <p:graphicFrame>
+        <p:nvGraphicFramePr>
+          <p:cNvPr id="6" name="Table 5">
+            <a:extLst>
+              <a:ext uri="{FF2B5EF4-FFF2-40B4-BE49-F238E27FC236}">
+                <a16:creationId xmlns:a16="http://schemas.microsoft.com/office/drawing/2014/main" id="{89DAAA09-BE9F-4302-874A-2DFF5890565A}"/>
+              </a:ext>
+            </a:extLst>
+          </p:cNvPr>
+          <p:cNvGraphicFramePr>
+            <a:graphicFrameLocks noGrp="1"/>
+          </p:cNvGraphicFramePr>
+          <p:nvPr>
+            <p:extLst>
+              <p:ext uri="{D42A27DB-BD31-4B8C-83A1-F6EECF244321}">
+                <p14:modId xmlns:p14="http://schemas.microsoft.com/office/powerpoint/2010/main" val="3223390565"/>
+              </p:ext>
+            </p:extLst>
+          </p:nvPr>
+        </p:nvGraphicFramePr>
+        <p:xfrm>
+          <a:off x="1457739" y="3610955"/>
+          <a:ext cx="7483220" cy="1954956"/>
+        </p:xfrm>
+        <a:graphic>
+          <a:graphicData uri="http://schemas.openxmlformats.org/drawingml/2006/table">
+            <a:tbl>
+              <a:tblPr firstRow="1" firstCol="1" bandRow="1">
+                <a:tableStyleId>{5C22544A-7EE6-4342-B048-85BDC9FD1C3A}</a:tableStyleId>
+              </a:tblPr>
+              <a:tblGrid>
+                <a:gridCol w="3741610">
+                  <a:extLst>
+                    <a:ext uri="{9D8B030D-6E8A-4147-A177-3AD203B41FA5}">
+                      <a16:colId xmlns:a16="http://schemas.microsoft.com/office/drawing/2014/main" val="4135153591"/>
+                    </a:ext>
+                  </a:extLst>
+                </a:gridCol>
+                <a:gridCol w="3741610">
+                  <a:extLst>
+                    <a:ext uri="{9D8B030D-6E8A-4147-A177-3AD203B41FA5}">
+                      <a16:colId xmlns:a16="http://schemas.microsoft.com/office/drawing/2014/main" val="3122603471"/>
+                    </a:ext>
+                  </a:extLst>
+                </a:gridCol>
+              </a:tblGrid>
+              <a:tr h="325826">
+                <a:tc>
+                  <a:txBody>
+                    <a:bodyPr/>
+                    <a:lstStyle/>
+                    <a:p>
+                      <a:pPr marL="0" marR="0">
+                        <a:lnSpc>
+                          <a:spcPct val="150000"/>
+                        </a:lnSpc>
+                        <a:spcBef>
+                          <a:spcPts val="0"/>
+                        </a:spcBef>
+                        <a:spcAft>
+                          <a:spcPts val="0"/>
+                        </a:spcAft>
+                      </a:pPr>
+                      <a:r>
+                        <a:rPr lang="en-US" sz="1100" kern="0">
+                          <a:effectLst/>
+                        </a:rPr>
+                        <a:t>Test case no</a:t>
+                      </a:r>
+                      <a:endParaRPr lang="en-US" sz="1200" kern="100">
+                        <a:effectLst/>
+                        <a:latin typeface="Liberation Serif"/>
+                        <a:ea typeface="Noto Serif CJK SC"/>
+                        <a:cs typeface="Lohit Devanagari"/>
+                      </a:endParaRPr>
+                    </a:p>
+                  </a:txBody>
+                  <a:tcPr marL="68580" marR="68580" marT="0" marB="0"/>
+                </a:tc>
+                <a:tc>
+                  <a:txBody>
+                    <a:bodyPr/>
+                    <a:lstStyle/>
+                    <a:p>
+                      <a:pPr marL="0" marR="0">
+                        <a:lnSpc>
+                          <a:spcPct val="150000"/>
+                        </a:lnSpc>
+                        <a:spcBef>
+                          <a:spcPts val="0"/>
+                        </a:spcBef>
+                        <a:spcAft>
+                          <a:spcPts val="0"/>
+                        </a:spcAft>
+                      </a:pPr>
+                      <a:r>
+                        <a:rPr lang="en-US" sz="1100" kern="0">
+                          <a:effectLst/>
+                        </a:rPr>
+                        <a:t>1</a:t>
+                      </a:r>
+                      <a:endParaRPr lang="en-US" sz="1200" kern="100">
+                        <a:effectLst/>
+                        <a:latin typeface="Liberation Serif"/>
+                        <a:ea typeface="Noto Serif CJK SC"/>
+                        <a:cs typeface="Lohit Devanagari"/>
+                      </a:endParaRPr>
+                    </a:p>
+                  </a:txBody>
+                  <a:tcPr marL="68580" marR="68580" marT="0" marB="0"/>
+                </a:tc>
+                <a:extLst>
+                  <a:ext uri="{0D108BD9-81ED-4DB2-BD59-A6C34878D82A}">
+                    <a16:rowId xmlns:a16="http://schemas.microsoft.com/office/drawing/2014/main" val="3031631140"/>
+                  </a:ext>
+                </a:extLst>
+              </a:tr>
+              <a:tr h="325826">
+                <a:tc>
+                  <a:txBody>
+                    <a:bodyPr/>
+                    <a:lstStyle/>
+                    <a:p>
+                      <a:pPr marL="0" marR="0">
+                        <a:lnSpc>
+                          <a:spcPct val="150000"/>
+                        </a:lnSpc>
+                        <a:spcBef>
+                          <a:spcPts val="0"/>
+                        </a:spcBef>
+                        <a:spcAft>
+                          <a:spcPts val="0"/>
+                        </a:spcAft>
+                      </a:pPr>
+                      <a:r>
+                        <a:rPr lang="en-US" sz="1100" kern="0">
+                          <a:effectLst/>
+                        </a:rPr>
+                        <a:t>Purpose of test</a:t>
+                      </a:r>
+                      <a:endParaRPr lang="en-US" sz="1200" kern="100">
+                        <a:effectLst/>
+                        <a:latin typeface="Liberation Serif"/>
+                        <a:ea typeface="Noto Serif CJK SC"/>
+                        <a:cs typeface="Lohit Devanagari"/>
+                      </a:endParaRPr>
+                    </a:p>
+                  </a:txBody>
+                  <a:tcPr marL="68580" marR="68580" marT="0" marB="0"/>
+                </a:tc>
+                <a:tc>
+                  <a:txBody>
+                    <a:bodyPr/>
+                    <a:lstStyle/>
+                    <a:p>
+                      <a:pPr marL="0" marR="0">
+                        <a:lnSpc>
+                          <a:spcPct val="150000"/>
+                        </a:lnSpc>
+                        <a:spcBef>
+                          <a:spcPts val="0"/>
+                        </a:spcBef>
+                        <a:spcAft>
+                          <a:spcPts val="0"/>
+                        </a:spcAft>
+                      </a:pPr>
+                      <a:r>
+                        <a:rPr lang="en-US" sz="1100" kern="0">
+                          <a:effectLst/>
+                        </a:rPr>
+                        <a:t>To check route is working</a:t>
+                      </a:r>
+                      <a:endParaRPr lang="en-US" sz="1200" kern="100">
+                        <a:effectLst/>
+                        <a:latin typeface="Liberation Serif"/>
+                        <a:ea typeface="Noto Serif CJK SC"/>
+                        <a:cs typeface="Lohit Devanagari"/>
+                      </a:endParaRPr>
+                    </a:p>
+                  </a:txBody>
+                  <a:tcPr marL="68580" marR="68580" marT="0" marB="0"/>
+                </a:tc>
+                <a:extLst>
+                  <a:ext uri="{0D108BD9-81ED-4DB2-BD59-A6C34878D82A}">
+                    <a16:rowId xmlns:a16="http://schemas.microsoft.com/office/drawing/2014/main" val="2010233632"/>
+                  </a:ext>
+                </a:extLst>
+              </a:tr>
+              <a:tr h="325826">
+                <a:tc>
+                  <a:txBody>
+                    <a:bodyPr/>
+                    <a:lstStyle/>
+                    <a:p>
+                      <a:pPr marL="0" marR="0">
+                        <a:lnSpc>
+                          <a:spcPct val="150000"/>
+                        </a:lnSpc>
+                        <a:spcBef>
+                          <a:spcPts val="0"/>
+                        </a:spcBef>
+                        <a:spcAft>
+                          <a:spcPts val="0"/>
+                        </a:spcAft>
+                      </a:pPr>
+                      <a:r>
+                        <a:rPr lang="en-US" sz="1100" kern="0">
+                          <a:effectLst/>
+                        </a:rPr>
+                        <a:t>Test data</a:t>
+                      </a:r>
+                      <a:endParaRPr lang="en-US" sz="1200" kern="100">
+                        <a:effectLst/>
+                        <a:latin typeface="Liberation Serif"/>
+                        <a:ea typeface="Noto Serif CJK SC"/>
+                        <a:cs typeface="Lohit Devanagari"/>
+                      </a:endParaRPr>
+                    </a:p>
+                  </a:txBody>
+                  <a:tcPr marL="68580" marR="68580" marT="0" marB="0"/>
+                </a:tc>
+                <a:tc>
+                  <a:txBody>
+                    <a:bodyPr/>
+                    <a:lstStyle/>
+                    <a:p>
+                      <a:pPr marL="0" marR="0">
+                        <a:lnSpc>
+                          <a:spcPct val="150000"/>
+                        </a:lnSpc>
+                        <a:spcBef>
+                          <a:spcPts val="0"/>
+                        </a:spcBef>
+                        <a:spcAft>
+                          <a:spcPts val="0"/>
+                        </a:spcAft>
+                      </a:pPr>
+                      <a:r>
+                        <a:rPr lang="en-US" sz="1100" kern="0">
+                          <a:effectLst/>
+                        </a:rPr>
+                        <a:t> </a:t>
+                      </a:r>
+                      <a:endParaRPr lang="en-US" sz="1200" kern="100">
+                        <a:effectLst/>
+                        <a:latin typeface="Liberation Serif"/>
+                        <a:ea typeface="Noto Serif CJK SC"/>
+                        <a:cs typeface="Lohit Devanagari"/>
+                      </a:endParaRPr>
+                    </a:p>
+                  </a:txBody>
+                  <a:tcPr marL="68580" marR="68580" marT="0" marB="0"/>
+                </a:tc>
+                <a:extLst>
+                  <a:ext uri="{0D108BD9-81ED-4DB2-BD59-A6C34878D82A}">
+                    <a16:rowId xmlns:a16="http://schemas.microsoft.com/office/drawing/2014/main" val="152719597"/>
+                  </a:ext>
+                </a:extLst>
+              </a:tr>
+              <a:tr h="325826">
+                <a:tc>
+                  <a:txBody>
+                    <a:bodyPr/>
+                    <a:lstStyle/>
+                    <a:p>
+                      <a:pPr marL="0" marR="0">
+                        <a:lnSpc>
+                          <a:spcPct val="150000"/>
+                        </a:lnSpc>
+                        <a:spcBef>
+                          <a:spcPts val="0"/>
+                        </a:spcBef>
+                        <a:spcAft>
+                          <a:spcPts val="0"/>
+                        </a:spcAft>
+                      </a:pPr>
+                      <a:r>
+                        <a:rPr lang="en-US" sz="1100" kern="0">
+                          <a:effectLst/>
+                        </a:rPr>
+                        <a:t>Expected result</a:t>
+                      </a:r>
+                      <a:endParaRPr lang="en-US" sz="1200" kern="100">
+                        <a:effectLst/>
+                        <a:latin typeface="Liberation Serif"/>
+                        <a:ea typeface="Noto Serif CJK SC"/>
+                        <a:cs typeface="Lohit Devanagari"/>
+                      </a:endParaRPr>
+                    </a:p>
+                  </a:txBody>
+                  <a:tcPr marL="68580" marR="68580" marT="0" marB="0"/>
+                </a:tc>
+                <a:tc>
+                  <a:txBody>
+                    <a:bodyPr/>
+                    <a:lstStyle/>
+                    <a:p>
+                      <a:pPr marL="0" marR="0">
+                        <a:lnSpc>
+                          <a:spcPct val="150000"/>
+                        </a:lnSpc>
+                        <a:spcBef>
+                          <a:spcPts val="0"/>
+                        </a:spcBef>
+                        <a:spcAft>
+                          <a:spcPts val="0"/>
+                        </a:spcAft>
+                      </a:pPr>
+                      <a:r>
+                        <a:rPr lang="en-US" sz="1100" kern="0">
+                          <a:effectLst/>
+                        </a:rPr>
+                        <a:t>Visit home page</a:t>
+                      </a:r>
+                      <a:endParaRPr lang="en-US" sz="1200" kern="100">
+                        <a:effectLst/>
+                        <a:latin typeface="Liberation Serif"/>
+                        <a:ea typeface="Noto Serif CJK SC"/>
+                        <a:cs typeface="Lohit Devanagari"/>
+                      </a:endParaRPr>
+                    </a:p>
+                  </a:txBody>
+                  <a:tcPr marL="68580" marR="68580" marT="0" marB="0"/>
+                </a:tc>
+                <a:extLst>
+                  <a:ext uri="{0D108BD9-81ED-4DB2-BD59-A6C34878D82A}">
+                    <a16:rowId xmlns:a16="http://schemas.microsoft.com/office/drawing/2014/main" val="4210968665"/>
+                  </a:ext>
+                </a:extLst>
+              </a:tr>
+              <a:tr h="325826">
+                <a:tc>
+                  <a:txBody>
+                    <a:bodyPr/>
+                    <a:lstStyle/>
+                    <a:p>
+                      <a:pPr marL="0" marR="0">
+                        <a:lnSpc>
+                          <a:spcPct val="150000"/>
+                        </a:lnSpc>
+                        <a:spcBef>
+                          <a:spcPts val="0"/>
+                        </a:spcBef>
+                        <a:spcAft>
+                          <a:spcPts val="0"/>
+                        </a:spcAft>
+                      </a:pPr>
+                      <a:r>
+                        <a:rPr lang="en-US" sz="1100" kern="0">
+                          <a:effectLst/>
+                        </a:rPr>
+                        <a:t>Actual Result</a:t>
+                      </a:r>
+                      <a:endParaRPr lang="en-US" sz="1200" kern="100">
+                        <a:effectLst/>
+                        <a:latin typeface="Liberation Serif"/>
+                        <a:ea typeface="Noto Serif CJK SC"/>
+                        <a:cs typeface="Lohit Devanagari"/>
+                      </a:endParaRPr>
+                    </a:p>
+                  </a:txBody>
+                  <a:tcPr marL="68580" marR="68580" marT="0" marB="0"/>
+                </a:tc>
+                <a:tc>
+                  <a:txBody>
+                    <a:bodyPr/>
+                    <a:lstStyle/>
+                    <a:p>
+                      <a:pPr marL="0" marR="0">
+                        <a:lnSpc>
+                          <a:spcPct val="150000"/>
+                        </a:lnSpc>
+                        <a:spcBef>
+                          <a:spcPts val="0"/>
+                        </a:spcBef>
+                        <a:spcAft>
+                          <a:spcPts val="0"/>
+                        </a:spcAft>
+                      </a:pPr>
+                      <a:r>
+                        <a:rPr lang="en-US" sz="1100" kern="0">
+                          <a:effectLst/>
+                        </a:rPr>
+                        <a:t>Successfully visited</a:t>
+                      </a:r>
+                      <a:endParaRPr lang="en-US" sz="1200" kern="100">
+                        <a:effectLst/>
+                        <a:latin typeface="Liberation Serif"/>
+                        <a:ea typeface="Noto Serif CJK SC"/>
+                        <a:cs typeface="Lohit Devanagari"/>
+                      </a:endParaRPr>
+                    </a:p>
+                  </a:txBody>
+                  <a:tcPr marL="68580" marR="68580" marT="0" marB="0"/>
+                </a:tc>
+                <a:extLst>
+                  <a:ext uri="{0D108BD9-81ED-4DB2-BD59-A6C34878D82A}">
+                    <a16:rowId xmlns:a16="http://schemas.microsoft.com/office/drawing/2014/main" val="1877300735"/>
+                  </a:ext>
+                </a:extLst>
+              </a:tr>
+              <a:tr h="325826">
+                <a:tc>
+                  <a:txBody>
+                    <a:bodyPr/>
+                    <a:lstStyle/>
+                    <a:p>
+                      <a:pPr marL="0" marR="0">
+                        <a:lnSpc>
+                          <a:spcPct val="150000"/>
+                        </a:lnSpc>
+                        <a:spcBef>
+                          <a:spcPts val="0"/>
+                        </a:spcBef>
+                        <a:spcAft>
+                          <a:spcPts val="0"/>
+                        </a:spcAft>
+                      </a:pPr>
+                      <a:r>
+                        <a:rPr lang="en-US" sz="1100" kern="0">
+                          <a:effectLst/>
+                        </a:rPr>
+                        <a:t>Class</a:t>
+                      </a:r>
+                      <a:endParaRPr lang="en-US" sz="1200" kern="100">
+                        <a:effectLst/>
+                        <a:latin typeface="Liberation Serif"/>
+                        <a:ea typeface="Noto Serif CJK SC"/>
+                        <a:cs typeface="Lohit Devanagari"/>
+                      </a:endParaRPr>
+                    </a:p>
+                  </a:txBody>
+                  <a:tcPr marL="68580" marR="68580" marT="0" marB="0"/>
+                </a:tc>
+                <a:tc>
+                  <a:txBody>
+                    <a:bodyPr/>
+                    <a:lstStyle/>
+                    <a:p>
+                      <a:pPr marL="0" marR="0">
+                        <a:lnSpc>
+                          <a:spcPct val="150000"/>
+                        </a:lnSpc>
+                        <a:spcBef>
+                          <a:spcPts val="0"/>
+                        </a:spcBef>
+                        <a:spcAft>
+                          <a:spcPts val="0"/>
+                        </a:spcAft>
+                      </a:pPr>
+                      <a:r>
+                        <a:rPr lang="en-US" sz="1100" kern="0" dirty="0" err="1">
+                          <a:effectLst/>
+                        </a:rPr>
+                        <a:t>testLogin</a:t>
+                      </a:r>
+                      <a:endParaRPr lang="en-US" sz="1200" kern="100" dirty="0">
+                        <a:effectLst/>
+                        <a:latin typeface="Liberation Serif"/>
+                        <a:ea typeface="Noto Serif CJK SC"/>
+                        <a:cs typeface="Lohit Devanagari"/>
+                      </a:endParaRPr>
+                    </a:p>
+                  </a:txBody>
+                  <a:tcPr marL="68580" marR="68580" marT="0" marB="0"/>
+                </a:tc>
+                <a:extLst>
+                  <a:ext uri="{0D108BD9-81ED-4DB2-BD59-A6C34878D82A}">
+                    <a16:rowId xmlns:a16="http://schemas.microsoft.com/office/drawing/2014/main" val="3310531593"/>
+                  </a:ext>
+                </a:extLst>
+              </a:tr>
+            </a:tbl>
+          </a:graphicData>
+        </a:graphic>
+      </p:graphicFrame>
+    </p:spTree>
+    <p:extLst>
+      <p:ext uri="{BB962C8B-B14F-4D97-AF65-F5344CB8AC3E}">
+        <p14:creationId xmlns:p14="http://schemas.microsoft.com/office/powerpoint/2010/main" val="472030483"/>
+      </p:ext>
+    </p:extLst>
+  </p:cSld>
+  <p:clrMapOvr>
+    <a:masterClrMapping/>
+  </p:clrMapOvr>
+</p:sld>
+</file>
+
+<file path=ppt/slides/slide25.xml><?xml version="1.0" encoding="utf-8"?>
+<p:sld xmlns:a="http://schemas.openxmlformats.org/drawingml/2006/main" xmlns:r="http://schemas.openxmlformats.org/officeDocument/2006/relationships" xmlns:p="http://schemas.openxmlformats.org/presentationml/2006/main">
+  <p:cSld>
+    <p:spTree>
+      <p:nvGrpSpPr>
+        <p:cNvPr id="1" name=""/>
+        <p:cNvGrpSpPr/>
+        <p:nvPr/>
+      </p:nvGrpSpPr>
+      <p:grpSpPr>
+        <a:xfrm>
+          <a:off x="0" y="0"/>
+          <a:ext cx="0" cy="0"/>
+          <a:chOff x="0" y="0"/>
+          <a:chExt cx="0" cy="0"/>
+        </a:xfrm>
+      </p:grpSpPr>
+      <p:sp>
+        <p:nvSpPr>
+          <p:cNvPr id="2" name="Title 1">
+            <a:extLst>
+              <a:ext uri="{FF2B5EF4-FFF2-40B4-BE49-F238E27FC236}">
+                <a16:creationId xmlns:a16="http://schemas.microsoft.com/office/drawing/2014/main" id="{CA484CFF-E2E7-4D4A-AB71-D5C918271EFB}"/>
+              </a:ext>
+            </a:extLst>
+          </p:cNvPr>
+          <p:cNvSpPr>
+            <a:spLocks noGrp="1"/>
+          </p:cNvSpPr>
+          <p:nvPr>
+            <p:ph type="title"/>
+          </p:nvPr>
+        </p:nvSpPr>
+        <p:spPr/>
+        <p:txBody>
+          <a:bodyPr/>
+          <a:lstStyle/>
+          <a:p>
+            <a:r>
+              <a:rPr lang="en-US" dirty="0"/>
+              <a:t>Test case 2</a:t>
+            </a:r>
+          </a:p>
+        </p:txBody>
+      </p:sp>
+      <p:pic>
+        <p:nvPicPr>
+          <p:cNvPr id="7" name="Content Placeholder 6">
+            <a:extLst>
+              <a:ext uri="{FF2B5EF4-FFF2-40B4-BE49-F238E27FC236}">
+                <a16:creationId xmlns:a16="http://schemas.microsoft.com/office/drawing/2014/main" id="{D365102F-332D-4AFE-A3FC-8EDE7719249E}"/>
+              </a:ext>
+            </a:extLst>
+          </p:cNvPr>
+          <p:cNvPicPr>
+            <a:picLocks noGrp="1"/>
+          </p:cNvPicPr>
+          <p:nvPr>
+            <p:ph idx="1"/>
+          </p:nvPr>
+        </p:nvPicPr>
+        <p:blipFill>
+          <a:blip r:embed="rId2">
+            <a:extLst>
+              <a:ext uri="{28A0092B-C50C-407E-A947-70E740481C1C}">
+                <a14:useLocalDpi xmlns:a14="http://schemas.microsoft.com/office/drawing/2010/main" val="0"/>
+              </a:ext>
+            </a:extLst>
+          </a:blip>
+          <a:stretch>
+            <a:fillRect/>
+          </a:stretch>
+        </p:blipFill>
+        <p:spPr>
+          <a:xfrm>
+            <a:off x="1457739" y="1980043"/>
+            <a:ext cx="4944165" cy="1267002"/>
+          </a:xfrm>
+          <a:prstGeom prst="rect">
+            <a:avLst/>
+          </a:prstGeom>
+        </p:spPr>
+      </p:pic>
+      <p:graphicFrame>
+        <p:nvGraphicFramePr>
+          <p:cNvPr id="8" name="Table 7">
+            <a:extLst>
+              <a:ext uri="{FF2B5EF4-FFF2-40B4-BE49-F238E27FC236}">
+                <a16:creationId xmlns:a16="http://schemas.microsoft.com/office/drawing/2014/main" id="{75A8CC52-1E04-4494-8000-6DD2BBEDC210}"/>
+              </a:ext>
+            </a:extLst>
+          </p:cNvPr>
+          <p:cNvGraphicFramePr>
+            <a:graphicFrameLocks noGrp="1"/>
+          </p:cNvGraphicFramePr>
+          <p:nvPr>
+            <p:extLst>
+              <p:ext uri="{D42A27DB-BD31-4B8C-83A1-F6EECF244321}">
+                <p14:modId xmlns:p14="http://schemas.microsoft.com/office/powerpoint/2010/main" val="1598386512"/>
+              </p:ext>
+            </p:extLst>
+          </p:nvPr>
+        </p:nvGraphicFramePr>
+        <p:xfrm>
+          <a:off x="1457739" y="3428999"/>
+          <a:ext cx="7447722" cy="2110410"/>
+        </p:xfrm>
+        <a:graphic>
+          <a:graphicData uri="http://schemas.openxmlformats.org/drawingml/2006/table">
+            <a:tbl>
+              <a:tblPr firstRow="1" firstCol="1" bandRow="1">
+                <a:tableStyleId>{5C22544A-7EE6-4342-B048-85BDC9FD1C3A}</a:tableStyleId>
+              </a:tblPr>
+              <a:tblGrid>
+                <a:gridCol w="3723861">
+                  <a:extLst>
+                    <a:ext uri="{9D8B030D-6E8A-4147-A177-3AD203B41FA5}">
+                      <a16:colId xmlns:a16="http://schemas.microsoft.com/office/drawing/2014/main" val="460047368"/>
+                    </a:ext>
+                  </a:extLst>
+                </a:gridCol>
+                <a:gridCol w="3723861">
+                  <a:extLst>
+                    <a:ext uri="{9D8B030D-6E8A-4147-A177-3AD203B41FA5}">
+                      <a16:colId xmlns:a16="http://schemas.microsoft.com/office/drawing/2014/main" val="1729517643"/>
+                    </a:ext>
+                  </a:extLst>
+                </a:gridCol>
+              </a:tblGrid>
+              <a:tr h="351735">
+                <a:tc>
+                  <a:txBody>
+                    <a:bodyPr/>
+                    <a:lstStyle/>
+                    <a:p>
+                      <a:pPr marL="0" marR="0">
+                        <a:lnSpc>
+                          <a:spcPct val="150000"/>
+                        </a:lnSpc>
+                        <a:spcBef>
+                          <a:spcPts val="0"/>
+                        </a:spcBef>
+                        <a:spcAft>
+                          <a:spcPts val="0"/>
+                        </a:spcAft>
+                      </a:pPr>
+                      <a:r>
+                        <a:rPr lang="en-US" sz="1100" kern="0">
+                          <a:effectLst/>
+                        </a:rPr>
+                        <a:t>Test case no</a:t>
+                      </a:r>
+                      <a:endParaRPr lang="en-US" sz="1200" kern="100">
+                        <a:effectLst/>
+                        <a:latin typeface="Liberation Serif"/>
+                        <a:ea typeface="Noto Serif CJK SC"/>
+                        <a:cs typeface="Lohit Devanagari"/>
+                      </a:endParaRPr>
+                    </a:p>
+                  </a:txBody>
+                  <a:tcPr marL="68580" marR="68580" marT="0" marB="0"/>
+                </a:tc>
+                <a:tc>
+                  <a:txBody>
+                    <a:bodyPr/>
+                    <a:lstStyle/>
+                    <a:p>
+                      <a:pPr marL="0" marR="0">
+                        <a:lnSpc>
+                          <a:spcPct val="150000"/>
+                        </a:lnSpc>
+                        <a:spcBef>
+                          <a:spcPts val="0"/>
+                        </a:spcBef>
+                        <a:spcAft>
+                          <a:spcPts val="0"/>
+                        </a:spcAft>
+                      </a:pPr>
+                      <a:r>
+                        <a:rPr lang="en-US" sz="1100" kern="0">
+                          <a:effectLst/>
+                        </a:rPr>
+                        <a:t>2</a:t>
+                      </a:r>
+                      <a:endParaRPr lang="en-US" sz="1200" kern="100">
+                        <a:effectLst/>
+                        <a:latin typeface="Liberation Serif"/>
+                        <a:ea typeface="Noto Serif CJK SC"/>
+                        <a:cs typeface="Lohit Devanagari"/>
+                      </a:endParaRPr>
+                    </a:p>
+                  </a:txBody>
+                  <a:tcPr marL="68580" marR="68580" marT="0" marB="0"/>
+                </a:tc>
+                <a:extLst>
+                  <a:ext uri="{0D108BD9-81ED-4DB2-BD59-A6C34878D82A}">
+                    <a16:rowId xmlns:a16="http://schemas.microsoft.com/office/drawing/2014/main" val="2153246364"/>
+                  </a:ext>
+                </a:extLst>
+              </a:tr>
+              <a:tr h="351735">
+                <a:tc>
+                  <a:txBody>
+                    <a:bodyPr/>
+                    <a:lstStyle/>
+                    <a:p>
+                      <a:pPr marL="0" marR="0">
+                        <a:lnSpc>
+                          <a:spcPct val="150000"/>
+                        </a:lnSpc>
+                        <a:spcBef>
+                          <a:spcPts val="0"/>
+                        </a:spcBef>
+                        <a:spcAft>
+                          <a:spcPts val="0"/>
+                        </a:spcAft>
+                      </a:pPr>
+                      <a:r>
+                        <a:rPr lang="en-US" sz="1100" kern="0">
+                          <a:effectLst/>
+                        </a:rPr>
+                        <a:t>Purpose of test</a:t>
+                      </a:r>
+                      <a:endParaRPr lang="en-US" sz="1200" kern="100">
+                        <a:effectLst/>
+                        <a:latin typeface="Liberation Serif"/>
+                        <a:ea typeface="Noto Serif CJK SC"/>
+                        <a:cs typeface="Lohit Devanagari"/>
+                      </a:endParaRPr>
+                    </a:p>
+                  </a:txBody>
+                  <a:tcPr marL="68580" marR="68580" marT="0" marB="0"/>
+                </a:tc>
+                <a:tc>
+                  <a:txBody>
+                    <a:bodyPr/>
+                    <a:lstStyle/>
+                    <a:p>
+                      <a:pPr marL="0" marR="0">
+                        <a:lnSpc>
+                          <a:spcPct val="150000"/>
+                        </a:lnSpc>
+                        <a:spcBef>
+                          <a:spcPts val="0"/>
+                        </a:spcBef>
+                        <a:spcAft>
+                          <a:spcPts val="0"/>
+                        </a:spcAft>
+                      </a:pPr>
+                      <a:r>
+                        <a:rPr lang="en-US" sz="1100" kern="0">
+                          <a:effectLst/>
+                        </a:rPr>
+                        <a:t>To check user can login without authentication</a:t>
+                      </a:r>
+                      <a:endParaRPr lang="en-US" sz="1200" kern="100">
+                        <a:effectLst/>
+                        <a:latin typeface="Liberation Serif"/>
+                        <a:ea typeface="Noto Serif CJK SC"/>
+                        <a:cs typeface="Lohit Devanagari"/>
+                      </a:endParaRPr>
+                    </a:p>
+                  </a:txBody>
+                  <a:tcPr marL="68580" marR="68580" marT="0" marB="0"/>
+                </a:tc>
+                <a:extLst>
+                  <a:ext uri="{0D108BD9-81ED-4DB2-BD59-A6C34878D82A}">
+                    <a16:rowId xmlns:a16="http://schemas.microsoft.com/office/drawing/2014/main" val="1010852500"/>
+                  </a:ext>
+                </a:extLst>
+              </a:tr>
+              <a:tr h="351735">
+                <a:tc>
+                  <a:txBody>
+                    <a:bodyPr/>
+                    <a:lstStyle/>
+                    <a:p>
+                      <a:pPr marL="0" marR="0">
+                        <a:lnSpc>
+                          <a:spcPct val="150000"/>
+                        </a:lnSpc>
+                        <a:spcBef>
+                          <a:spcPts val="0"/>
+                        </a:spcBef>
+                        <a:spcAft>
+                          <a:spcPts val="0"/>
+                        </a:spcAft>
+                      </a:pPr>
+                      <a:r>
+                        <a:rPr lang="en-US" sz="1100" kern="0">
+                          <a:effectLst/>
+                        </a:rPr>
+                        <a:t>Test data</a:t>
+                      </a:r>
+                      <a:endParaRPr lang="en-US" sz="1200" kern="100">
+                        <a:effectLst/>
+                        <a:latin typeface="Liberation Serif"/>
+                        <a:ea typeface="Noto Serif CJK SC"/>
+                        <a:cs typeface="Lohit Devanagari"/>
+                      </a:endParaRPr>
+                    </a:p>
+                  </a:txBody>
+                  <a:tcPr marL="68580" marR="68580" marT="0" marB="0"/>
+                </a:tc>
+                <a:tc>
+                  <a:txBody>
+                    <a:bodyPr/>
+                    <a:lstStyle/>
+                    <a:p>
+                      <a:pPr marL="0" marR="0">
+                        <a:lnSpc>
+                          <a:spcPct val="150000"/>
+                        </a:lnSpc>
+                        <a:spcBef>
+                          <a:spcPts val="0"/>
+                        </a:spcBef>
+                        <a:spcAft>
+                          <a:spcPts val="0"/>
+                        </a:spcAft>
+                      </a:pPr>
+                      <a:r>
+                        <a:rPr lang="en-US" sz="1100" kern="0">
+                          <a:effectLst/>
+                        </a:rPr>
+                        <a:t> </a:t>
+                      </a:r>
+                      <a:endParaRPr lang="en-US" sz="1200" kern="100">
+                        <a:effectLst/>
+                        <a:latin typeface="Liberation Serif"/>
+                        <a:ea typeface="Noto Serif CJK SC"/>
+                        <a:cs typeface="Lohit Devanagari"/>
+                      </a:endParaRPr>
+                    </a:p>
+                  </a:txBody>
+                  <a:tcPr marL="68580" marR="68580" marT="0" marB="0"/>
+                </a:tc>
+                <a:extLst>
+                  <a:ext uri="{0D108BD9-81ED-4DB2-BD59-A6C34878D82A}">
+                    <a16:rowId xmlns:a16="http://schemas.microsoft.com/office/drawing/2014/main" val="2845686357"/>
+                  </a:ext>
+                </a:extLst>
+              </a:tr>
+              <a:tr h="351735">
+                <a:tc>
+                  <a:txBody>
+                    <a:bodyPr/>
+                    <a:lstStyle/>
+                    <a:p>
+                      <a:pPr marL="0" marR="0">
+                        <a:lnSpc>
+                          <a:spcPct val="150000"/>
+                        </a:lnSpc>
+                        <a:spcBef>
+                          <a:spcPts val="0"/>
+                        </a:spcBef>
+                        <a:spcAft>
+                          <a:spcPts val="0"/>
+                        </a:spcAft>
+                      </a:pPr>
+                      <a:r>
+                        <a:rPr lang="en-US" sz="1100" kern="0">
+                          <a:effectLst/>
+                        </a:rPr>
+                        <a:t>Expected result</a:t>
+                      </a:r>
+                      <a:endParaRPr lang="en-US" sz="1200" kern="100">
+                        <a:effectLst/>
+                        <a:latin typeface="Liberation Serif"/>
+                        <a:ea typeface="Noto Serif CJK SC"/>
+                        <a:cs typeface="Lohit Devanagari"/>
+                      </a:endParaRPr>
+                    </a:p>
+                  </a:txBody>
+                  <a:tcPr marL="68580" marR="68580" marT="0" marB="0"/>
+                </a:tc>
+                <a:tc>
+                  <a:txBody>
+                    <a:bodyPr/>
+                    <a:lstStyle/>
+                    <a:p>
+                      <a:pPr marL="0" marR="0">
+                        <a:lnSpc>
+                          <a:spcPct val="150000"/>
+                        </a:lnSpc>
+                        <a:spcBef>
+                          <a:spcPts val="0"/>
+                        </a:spcBef>
+                        <a:spcAft>
+                          <a:spcPts val="0"/>
+                        </a:spcAft>
+                      </a:pPr>
+                      <a:r>
+                        <a:rPr lang="en-US" sz="1100" kern="0">
+                          <a:effectLst/>
+                        </a:rPr>
+                        <a:t>Redirect to login</a:t>
+                      </a:r>
+                      <a:endParaRPr lang="en-US" sz="1200" kern="100">
+                        <a:effectLst/>
+                        <a:latin typeface="Liberation Serif"/>
+                        <a:ea typeface="Noto Serif CJK SC"/>
+                        <a:cs typeface="Lohit Devanagari"/>
+                      </a:endParaRPr>
+                    </a:p>
+                  </a:txBody>
+                  <a:tcPr marL="68580" marR="68580" marT="0" marB="0"/>
+                </a:tc>
+                <a:extLst>
+                  <a:ext uri="{0D108BD9-81ED-4DB2-BD59-A6C34878D82A}">
+                    <a16:rowId xmlns:a16="http://schemas.microsoft.com/office/drawing/2014/main" val="657069049"/>
+                  </a:ext>
+                </a:extLst>
+              </a:tr>
+              <a:tr h="351735">
+                <a:tc>
+                  <a:txBody>
+                    <a:bodyPr/>
+                    <a:lstStyle/>
+                    <a:p>
+                      <a:pPr marL="0" marR="0">
+                        <a:lnSpc>
+                          <a:spcPct val="150000"/>
+                        </a:lnSpc>
+                        <a:spcBef>
+                          <a:spcPts val="0"/>
+                        </a:spcBef>
+                        <a:spcAft>
+                          <a:spcPts val="0"/>
+                        </a:spcAft>
+                      </a:pPr>
+                      <a:r>
+                        <a:rPr lang="en-US" sz="1100" kern="0">
+                          <a:effectLst/>
+                        </a:rPr>
+                        <a:t>Actual Result</a:t>
+                      </a:r>
+                      <a:endParaRPr lang="en-US" sz="1200" kern="100">
+                        <a:effectLst/>
+                        <a:latin typeface="Liberation Serif"/>
+                        <a:ea typeface="Noto Serif CJK SC"/>
+                        <a:cs typeface="Lohit Devanagari"/>
+                      </a:endParaRPr>
+                    </a:p>
+                  </a:txBody>
+                  <a:tcPr marL="68580" marR="68580" marT="0" marB="0"/>
+                </a:tc>
+                <a:tc>
+                  <a:txBody>
+                    <a:bodyPr/>
+                    <a:lstStyle/>
+                    <a:p>
+                      <a:pPr marL="0" marR="0">
+                        <a:lnSpc>
+                          <a:spcPct val="150000"/>
+                        </a:lnSpc>
+                        <a:spcBef>
+                          <a:spcPts val="0"/>
+                        </a:spcBef>
+                        <a:spcAft>
+                          <a:spcPts val="0"/>
+                        </a:spcAft>
+                        <a:tabLst>
+                          <a:tab pos="1459865" algn="ctr"/>
+                        </a:tabLst>
+                      </a:pPr>
+                      <a:r>
+                        <a:rPr lang="en-US" sz="1100" kern="0">
+                          <a:effectLst/>
+                        </a:rPr>
+                        <a:t>Redirected to login	</a:t>
+                      </a:r>
+                      <a:endParaRPr lang="en-US" sz="1200" kern="100">
+                        <a:effectLst/>
+                        <a:latin typeface="Liberation Serif"/>
+                        <a:ea typeface="Noto Serif CJK SC"/>
+                        <a:cs typeface="Lohit Devanagari"/>
+                      </a:endParaRPr>
+                    </a:p>
+                  </a:txBody>
+                  <a:tcPr marL="68580" marR="68580" marT="0" marB="0"/>
+                </a:tc>
+                <a:extLst>
+                  <a:ext uri="{0D108BD9-81ED-4DB2-BD59-A6C34878D82A}">
+                    <a16:rowId xmlns:a16="http://schemas.microsoft.com/office/drawing/2014/main" val="493385560"/>
+                  </a:ext>
+                </a:extLst>
+              </a:tr>
+              <a:tr h="351735">
+                <a:tc>
+                  <a:txBody>
+                    <a:bodyPr/>
+                    <a:lstStyle/>
+                    <a:p>
+                      <a:pPr marL="0" marR="0">
+                        <a:lnSpc>
+                          <a:spcPct val="150000"/>
+                        </a:lnSpc>
+                        <a:spcBef>
+                          <a:spcPts val="0"/>
+                        </a:spcBef>
+                        <a:spcAft>
+                          <a:spcPts val="0"/>
+                        </a:spcAft>
+                      </a:pPr>
+                      <a:r>
+                        <a:rPr lang="en-US" sz="1100" kern="0">
+                          <a:effectLst/>
+                        </a:rPr>
+                        <a:t>Class</a:t>
+                      </a:r>
+                      <a:endParaRPr lang="en-US" sz="1200" kern="100">
+                        <a:effectLst/>
+                        <a:latin typeface="Liberation Serif"/>
+                        <a:ea typeface="Noto Serif CJK SC"/>
+                        <a:cs typeface="Lohit Devanagari"/>
+                      </a:endParaRPr>
+                    </a:p>
+                  </a:txBody>
+                  <a:tcPr marL="68580" marR="68580" marT="0" marB="0"/>
+                </a:tc>
+                <a:tc>
+                  <a:txBody>
+                    <a:bodyPr/>
+                    <a:lstStyle/>
+                    <a:p>
+                      <a:pPr marL="0" marR="0">
+                        <a:lnSpc>
+                          <a:spcPct val="150000"/>
+                        </a:lnSpc>
+                        <a:spcBef>
+                          <a:spcPts val="0"/>
+                        </a:spcBef>
+                        <a:spcAft>
+                          <a:spcPts val="0"/>
+                        </a:spcAft>
+                        <a:tabLst>
+                          <a:tab pos="885825" algn="l"/>
+                        </a:tabLst>
+                      </a:pPr>
+                      <a:r>
+                        <a:rPr lang="en-US" sz="1100" kern="0" dirty="0" err="1">
+                          <a:effectLst/>
+                        </a:rPr>
+                        <a:t>testLogin</a:t>
+                      </a:r>
+                      <a:r>
+                        <a:rPr lang="en-US" sz="1100" kern="0" dirty="0">
+                          <a:effectLst/>
+                        </a:rPr>
+                        <a:t>, </a:t>
+                      </a:r>
+                      <a:r>
+                        <a:rPr lang="en-US" sz="1100" kern="0" dirty="0" err="1">
+                          <a:effectLst/>
+                        </a:rPr>
+                        <a:t>UserFactory</a:t>
+                      </a:r>
+                      <a:endParaRPr lang="en-US" sz="1200" kern="100" dirty="0">
+                        <a:effectLst/>
+                        <a:latin typeface="Liberation Serif"/>
+                        <a:ea typeface="Noto Serif CJK SC"/>
+                        <a:cs typeface="Lohit Devanagari"/>
+                      </a:endParaRPr>
+                    </a:p>
+                  </a:txBody>
+                  <a:tcPr marL="68580" marR="68580" marT="0" marB="0"/>
+                </a:tc>
+                <a:extLst>
+                  <a:ext uri="{0D108BD9-81ED-4DB2-BD59-A6C34878D82A}">
+                    <a16:rowId xmlns:a16="http://schemas.microsoft.com/office/drawing/2014/main" val="4290907757"/>
+                  </a:ext>
+                </a:extLst>
+              </a:tr>
+            </a:tbl>
+          </a:graphicData>
+        </a:graphic>
+      </p:graphicFrame>
+    </p:spTree>
+    <p:extLst>
+      <p:ext uri="{BB962C8B-B14F-4D97-AF65-F5344CB8AC3E}">
+        <p14:creationId xmlns:p14="http://schemas.microsoft.com/office/powerpoint/2010/main" val="149969066"/>
+      </p:ext>
+    </p:extLst>
+  </p:cSld>
+  <p:clrMapOvr>
+    <a:masterClrMapping/>
+  </p:clrMapOvr>
+</p:sld>
+</file>
+
+<file path=ppt/slides/slide26.xml><?xml version="1.0" encoding="utf-8"?>
 <p:sld xmlns:a="http://schemas.openxmlformats.org/drawingml/2006/main" xmlns:r="http://schemas.openxmlformats.org/officeDocument/2006/relationships" xmlns:p="http://schemas.openxmlformats.org/presentationml/2006/main">
   <p:cSld>
     <p:spTree>
@@ -37124,12 +38478,18 @@
           <a:bodyPr/>
           <a:lstStyle/>
           <a:p>
+            <a:pPr marL="0" indent="0">
+              <a:buNone/>
+            </a:pPr>
             <a:r>
               <a:rPr lang="en-US" dirty="0"/>
               <a:t>Make payment system</a:t>
             </a:r>
           </a:p>
           <a:p>
+            <a:pPr marL="0" indent="0">
+              <a:buNone/>
+            </a:pPr>
             <a:r>
               <a:rPr lang="en-US" dirty="0"/>
               <a:t>User can sign up with social media like </a:t>
@@ -37149,6 +38509,9 @@
             <a:endParaRPr lang="en-US" dirty="0"/>
           </a:p>
           <a:p>
+            <a:pPr marL="0" indent="0">
+              <a:buNone/>
+            </a:pPr>
             <a:r>
               <a:rPr lang="en-US" dirty="0"/>
               <a:t>GUI modification for more interactive experience.</a:t>
@@ -37158,7 +38521,10 @@
             <a:pPr marL="0" indent="0">
               <a:buNone/>
             </a:pPr>
-            <a:endParaRPr lang="en-US" dirty="0"/>
+            <a:r>
+              <a:rPr lang="en-US" dirty="0"/>
+              <a:t>Real time chat system</a:t>
+            </a:r>
           </a:p>
         </p:txBody>
       </p:sp>
@@ -37175,7 +38541,7 @@
 </p:sld>
 </file>
 
-<file path=ppt/slides/slide24.xml><?xml version="1.0" encoding="utf-8"?>
+<file path=ppt/slides/slide27.xml><?xml version="1.0" encoding="utf-8"?>
 <p:sld xmlns:a="http://schemas.openxmlformats.org/drawingml/2006/main" xmlns:r="http://schemas.openxmlformats.org/officeDocument/2006/relationships" xmlns:p="http://schemas.openxmlformats.org/presentationml/2006/main">
   <p:cSld>
     <p:spTree>
@@ -37241,7 +38607,28 @@
           <a:bodyPr/>
           <a:lstStyle/>
           <a:p>
-            <a:endParaRPr lang="en-US" dirty="0"/>
+            <a:r>
+              <a:rPr lang="en-US" dirty="0"/>
+              <a:t>By using electronic technology through the internet, it achieved. </a:t>
+            </a:r>
+          </a:p>
+          <a:p>
+            <a:r>
+              <a:rPr lang="en-US" dirty="0"/>
+              <a:t>More competitions, more marketplaces, faster transactions, and more advanced technologies</a:t>
+            </a:r>
+          </a:p>
+          <a:p>
+            <a:r>
+              <a:rPr lang="en-US" dirty="0"/>
+              <a:t>To make activities between customers and producers more active.</a:t>
+            </a:r>
+          </a:p>
+          <a:p>
+            <a:r>
+              <a:rPr lang="en-US" dirty="0"/>
+              <a:t>We as customers and internet users are responsible to keep our e-commerce healthy and safe so that e-business can be more reliable in the future</a:t>
+            </a:r>
           </a:p>
         </p:txBody>
       </p:sp>
@@ -37259,6 +38646,113 @@
 </file>
 
 <file path=ppt/slides/slide3.xml><?xml version="1.0" encoding="utf-8"?>
+<p:sld xmlns:a="http://schemas.openxmlformats.org/drawingml/2006/main" xmlns:r="http://schemas.openxmlformats.org/officeDocument/2006/relationships" xmlns:p="http://schemas.openxmlformats.org/presentationml/2006/main">
+  <p:cSld>
+    <p:spTree>
+      <p:nvGrpSpPr>
+        <p:cNvPr id="1" name=""/>
+        <p:cNvGrpSpPr/>
+        <p:nvPr/>
+      </p:nvGrpSpPr>
+      <p:grpSpPr>
+        <a:xfrm>
+          <a:off x="0" y="0"/>
+          <a:ext cx="0" cy="0"/>
+          <a:chOff x="0" y="0"/>
+          <a:chExt cx="0" cy="0"/>
+        </a:xfrm>
+      </p:grpSpPr>
+      <p:sp>
+        <p:nvSpPr>
+          <p:cNvPr id="2" name="Title 1">
+            <a:extLst>
+              <a:ext uri="{FF2B5EF4-FFF2-40B4-BE49-F238E27FC236}">
+                <a16:creationId xmlns:a16="http://schemas.microsoft.com/office/drawing/2014/main" id="{C884D29F-B2C6-4671-AA04-CB3DCB33D2D3}"/>
+              </a:ext>
+            </a:extLst>
+          </p:cNvPr>
+          <p:cNvSpPr>
+            <a:spLocks noGrp="1"/>
+          </p:cNvSpPr>
+          <p:nvPr>
+            <p:ph type="title"/>
+          </p:nvPr>
+        </p:nvSpPr>
+        <p:spPr/>
+        <p:txBody>
+          <a:bodyPr/>
+          <a:lstStyle/>
+          <a:p>
+            <a:r>
+              <a:rPr lang="en-US" dirty="0"/>
+              <a:t>Problem statement</a:t>
+            </a:r>
+          </a:p>
+        </p:txBody>
+      </p:sp>
+      <p:sp>
+        <p:nvSpPr>
+          <p:cNvPr id="3" name="Content Placeholder 2">
+            <a:extLst>
+              <a:ext uri="{FF2B5EF4-FFF2-40B4-BE49-F238E27FC236}">
+                <a16:creationId xmlns:a16="http://schemas.microsoft.com/office/drawing/2014/main" id="{D714C3E2-2EBE-4494-88A0-F454E76F711E}"/>
+              </a:ext>
+            </a:extLst>
+          </p:cNvPr>
+          <p:cNvSpPr>
+            <a:spLocks noGrp="1"/>
+          </p:cNvSpPr>
+          <p:nvPr>
+            <p:ph idx="1"/>
+          </p:nvPr>
+        </p:nvSpPr>
+        <p:spPr/>
+        <p:txBody>
+          <a:bodyPr/>
+          <a:lstStyle/>
+          <a:p>
+            <a:pPr marL="0" indent="0">
+              <a:buNone/>
+            </a:pPr>
+            <a:r>
+              <a:rPr lang="en-US" dirty="0"/>
+              <a:t>Direct chat with seller</a:t>
+            </a:r>
+          </a:p>
+          <a:p>
+            <a:pPr marL="0" indent="0">
+              <a:buNone/>
+            </a:pPr>
+            <a:r>
+              <a:rPr lang="en-US" dirty="0"/>
+              <a:t>Online payment system </a:t>
+            </a:r>
+          </a:p>
+          <a:p>
+            <a:pPr marL="0" indent="0">
+              <a:buNone/>
+            </a:pPr>
+            <a:r>
+              <a:rPr lang="en-US" dirty="0"/>
+              <a:t>Not supportive to local market</a:t>
+            </a:r>
+          </a:p>
+        </p:txBody>
+      </p:sp>
+    </p:spTree>
+    <p:extLst>
+      <p:ext uri="{BB962C8B-B14F-4D97-AF65-F5344CB8AC3E}">
+        <p14:creationId xmlns:p14="http://schemas.microsoft.com/office/powerpoint/2010/main" val="4137346787"/>
+      </p:ext>
+    </p:extLst>
+  </p:cSld>
+  <p:clrMapOvr>
+    <a:masterClrMapping/>
+  </p:clrMapOvr>
+</p:sld>
+</file>
+
+<file path=ppt/slides/slide4.xml><?xml version="1.0" encoding="utf-8"?>
 <p:sld xmlns:a="http://schemas.openxmlformats.org/drawingml/2006/main" xmlns:r="http://schemas.openxmlformats.org/officeDocument/2006/relationships" xmlns:p="http://schemas.openxmlformats.org/presentationml/2006/main">
   <p:cSld>
     <p:spTree>
@@ -37298,7 +38792,7 @@
           <a:p>
             <a:r>
               <a:rPr lang="en-US" dirty="0"/>
-              <a:t>Goals</a:t>
+              <a:t>Aims and objectives</a:t>
             </a:r>
           </a:p>
         </p:txBody>
@@ -37362,7 +38856,7 @@
 </p:sld>
 </file>
 
-<file path=ppt/slides/slide4.xml><?xml version="1.0" encoding="utf-8"?>
+<file path=ppt/slides/slide5.xml><?xml version="1.0" encoding="utf-8"?>
 <p:sld xmlns:a="http://schemas.openxmlformats.org/drawingml/2006/main" xmlns:r="http://schemas.openxmlformats.org/officeDocument/2006/relationships" xmlns:p="http://schemas.openxmlformats.org/presentationml/2006/main">
   <p:cSld>
     <p:spTree>
@@ -37472,206 +38966,7 @@
 </p:sld>
 </file>
 
-<file path=ppt/slides/slide5.xml><?xml version="1.0" encoding="utf-8"?>
-<p:sld xmlns:a="http://schemas.openxmlformats.org/drawingml/2006/main" xmlns:r="http://schemas.openxmlformats.org/officeDocument/2006/relationships" xmlns:p="http://schemas.openxmlformats.org/presentationml/2006/main">
-  <p:cSld>
-    <p:spTree>
-      <p:nvGrpSpPr>
-        <p:cNvPr id="1" name=""/>
-        <p:cNvGrpSpPr/>
-        <p:nvPr/>
-      </p:nvGrpSpPr>
-      <p:grpSpPr>
-        <a:xfrm>
-          <a:off x="0" y="0"/>
-          <a:ext cx="0" cy="0"/>
-          <a:chOff x="0" y="0"/>
-          <a:chExt cx="0" cy="0"/>
-        </a:xfrm>
-      </p:grpSpPr>
-      <p:sp>
-        <p:nvSpPr>
-          <p:cNvPr id="2" name="Title 1">
-            <a:extLst>
-              <a:ext uri="{FF2B5EF4-FFF2-40B4-BE49-F238E27FC236}">
-                <a16:creationId xmlns:a16="http://schemas.microsoft.com/office/drawing/2014/main" id="{21124785-B95B-406A-89D9-3F4BF7C63648}"/>
-              </a:ext>
-            </a:extLst>
-          </p:cNvPr>
-          <p:cNvSpPr>
-            <a:spLocks noGrp="1"/>
-          </p:cNvSpPr>
-          <p:nvPr>
-            <p:ph type="title"/>
-          </p:nvPr>
-        </p:nvSpPr>
-        <p:spPr/>
-        <p:txBody>
-          <a:bodyPr/>
-          <a:lstStyle/>
-          <a:p>
-            <a:r>
-              <a:rPr lang="en-US" dirty="0"/>
-              <a:t>Advantage	</a:t>
-            </a:r>
-          </a:p>
-        </p:txBody>
-      </p:sp>
-      <p:sp>
-        <p:nvSpPr>
-          <p:cNvPr id="3" name="Content Placeholder 2">
-            <a:extLst>
-              <a:ext uri="{FF2B5EF4-FFF2-40B4-BE49-F238E27FC236}">
-                <a16:creationId xmlns:a16="http://schemas.microsoft.com/office/drawing/2014/main" id="{B2D5467A-1E8A-4BC9-AD68-A40E697361BC}"/>
-              </a:ext>
-            </a:extLst>
-          </p:cNvPr>
-          <p:cNvSpPr>
-            <a:spLocks noGrp="1"/>
-          </p:cNvSpPr>
-          <p:nvPr>
-            <p:ph idx="1"/>
-          </p:nvPr>
-        </p:nvSpPr>
-        <p:spPr/>
-        <p:txBody>
-          <a:bodyPr/>
-          <a:lstStyle/>
-          <a:p>
-            <a:r>
-              <a:rPr lang="en-US" dirty="0"/>
-              <a:t>Low cost</a:t>
-            </a:r>
-          </a:p>
-          <a:p>
-            <a:r>
-              <a:rPr lang="en-US" dirty="0"/>
-              <a:t>No checkout queues</a:t>
-            </a:r>
-          </a:p>
-          <a:p>
-            <a:r>
-              <a:rPr lang="en-US" dirty="0"/>
-              <a:t>Shop from anywhere </a:t>
-            </a:r>
-          </a:p>
-        </p:txBody>
-      </p:sp>
-    </p:spTree>
-    <p:extLst>
-      <p:ext uri="{BB962C8B-B14F-4D97-AF65-F5344CB8AC3E}">
-        <p14:creationId xmlns:p14="http://schemas.microsoft.com/office/powerpoint/2010/main" val="276630159"/>
-      </p:ext>
-    </p:extLst>
-  </p:cSld>
-  <p:clrMapOvr>
-    <a:masterClrMapping/>
-  </p:clrMapOvr>
-</p:sld>
-</file>
-
 <file path=ppt/slides/slide6.xml><?xml version="1.0" encoding="utf-8"?>
-<p:sld xmlns:a="http://schemas.openxmlformats.org/drawingml/2006/main" xmlns:r="http://schemas.openxmlformats.org/officeDocument/2006/relationships" xmlns:p="http://schemas.openxmlformats.org/presentationml/2006/main">
-  <p:cSld>
-    <p:spTree>
-      <p:nvGrpSpPr>
-        <p:cNvPr id="1" name=""/>
-        <p:cNvGrpSpPr/>
-        <p:nvPr/>
-      </p:nvGrpSpPr>
-      <p:grpSpPr>
-        <a:xfrm>
-          <a:off x="0" y="0"/>
-          <a:ext cx="0" cy="0"/>
-          <a:chOff x="0" y="0"/>
-          <a:chExt cx="0" cy="0"/>
-        </a:xfrm>
-      </p:grpSpPr>
-      <p:sp>
-        <p:nvSpPr>
-          <p:cNvPr id="2" name="Title 1">
-            <a:extLst>
-              <a:ext uri="{FF2B5EF4-FFF2-40B4-BE49-F238E27FC236}">
-                <a16:creationId xmlns:a16="http://schemas.microsoft.com/office/drawing/2014/main" id="{B7CA4D5E-87BC-4B32-8A95-D35CE334782D}"/>
-              </a:ext>
-            </a:extLst>
-          </p:cNvPr>
-          <p:cNvSpPr>
-            <a:spLocks noGrp="1"/>
-          </p:cNvSpPr>
-          <p:nvPr>
-            <p:ph type="title"/>
-          </p:nvPr>
-        </p:nvSpPr>
-        <p:spPr/>
-        <p:txBody>
-          <a:bodyPr/>
-          <a:lstStyle/>
-          <a:p>
-            <a:r>
-              <a:rPr lang="en-US" dirty="0"/>
-              <a:t>Disadvantage</a:t>
-            </a:r>
-          </a:p>
-        </p:txBody>
-      </p:sp>
-      <p:sp>
-        <p:nvSpPr>
-          <p:cNvPr id="3" name="Content Placeholder 2">
-            <a:extLst>
-              <a:ext uri="{FF2B5EF4-FFF2-40B4-BE49-F238E27FC236}">
-                <a16:creationId xmlns:a16="http://schemas.microsoft.com/office/drawing/2014/main" id="{77F5FC93-4A29-4261-9A28-0B638104A0AF}"/>
-              </a:ext>
-            </a:extLst>
-          </p:cNvPr>
-          <p:cNvSpPr>
-            <a:spLocks noGrp="1"/>
-          </p:cNvSpPr>
-          <p:nvPr>
-            <p:ph idx="1"/>
-          </p:nvPr>
-        </p:nvSpPr>
-        <p:spPr/>
-        <p:txBody>
-          <a:bodyPr/>
-          <a:lstStyle/>
-          <a:p>
-            <a:r>
-              <a:rPr lang="en-US" dirty="0"/>
-              <a:t>Security issue</a:t>
-            </a:r>
-          </a:p>
-          <a:p>
-            <a:r>
-              <a:rPr lang="en-US" dirty="0"/>
-              <a:t>Product fault</a:t>
-            </a:r>
-          </a:p>
-          <a:p>
-            <a:r>
-              <a:rPr lang="en-US" dirty="0"/>
-              <a:t>Possibility of fraud.</a:t>
-            </a:r>
-          </a:p>
-          <a:p>
-            <a:endParaRPr lang="en-US" dirty="0"/>
-          </a:p>
-        </p:txBody>
-      </p:sp>
-    </p:spTree>
-    <p:extLst>
-      <p:ext uri="{BB962C8B-B14F-4D97-AF65-F5344CB8AC3E}">
-        <p14:creationId xmlns:p14="http://schemas.microsoft.com/office/powerpoint/2010/main" val="1566591253"/>
-      </p:ext>
-    </p:extLst>
-  </p:cSld>
-  <p:clrMapOvr>
-    <a:masterClrMapping/>
-  </p:clrMapOvr>
-</p:sld>
-</file>
-
-<file path=ppt/slides/slide7.xml><?xml version="1.0" encoding="utf-8"?>
 <p:sld xmlns:a="http://schemas.openxmlformats.org/drawingml/2006/main" xmlns:r="http://schemas.openxmlformats.org/officeDocument/2006/relationships" xmlns:p="http://schemas.openxmlformats.org/presentationml/2006/main">
   <p:cSld>
     <p:spTree>
@@ -37760,6 +39055,102 @@
 </p:sld>
 </file>
 
+<file path=ppt/slides/slide7.xml><?xml version="1.0" encoding="utf-8"?>
+<p:sld xmlns:a="http://schemas.openxmlformats.org/drawingml/2006/main" xmlns:r="http://schemas.openxmlformats.org/officeDocument/2006/relationships" xmlns:p="http://schemas.openxmlformats.org/presentationml/2006/main">
+  <p:cSld>
+    <p:spTree>
+      <p:nvGrpSpPr>
+        <p:cNvPr id="1" name=""/>
+        <p:cNvGrpSpPr/>
+        <p:nvPr/>
+      </p:nvGrpSpPr>
+      <p:grpSpPr>
+        <a:xfrm>
+          <a:off x="0" y="0"/>
+          <a:ext cx="0" cy="0"/>
+          <a:chOff x="0" y="0"/>
+          <a:chExt cx="0" cy="0"/>
+        </a:xfrm>
+      </p:grpSpPr>
+      <p:sp>
+        <p:nvSpPr>
+          <p:cNvPr id="2" name="Title 1">
+            <a:extLst>
+              <a:ext uri="{FF2B5EF4-FFF2-40B4-BE49-F238E27FC236}">
+                <a16:creationId xmlns:a16="http://schemas.microsoft.com/office/drawing/2014/main" id="{0561E82A-6674-4DAB-AFB6-548D127D3AF9}"/>
+              </a:ext>
+            </a:extLst>
+          </p:cNvPr>
+          <p:cNvSpPr>
+            <a:spLocks noGrp="1"/>
+          </p:cNvSpPr>
+          <p:nvPr>
+            <p:ph type="title"/>
+          </p:nvPr>
+        </p:nvSpPr>
+        <p:spPr/>
+        <p:txBody>
+          <a:bodyPr/>
+          <a:lstStyle/>
+          <a:p>
+            <a:r>
+              <a:rPr lang="en-US" dirty="0"/>
+              <a:t>Gantt Chart-1</a:t>
+            </a:r>
+          </a:p>
+        </p:txBody>
+      </p:sp>
+      <p:pic>
+        <p:nvPicPr>
+          <p:cNvPr id="4" name="Content Placeholder 3">
+            <a:extLst>
+              <a:ext uri="{FF2B5EF4-FFF2-40B4-BE49-F238E27FC236}">
+                <a16:creationId xmlns:a16="http://schemas.microsoft.com/office/drawing/2014/main" id="{EE9DC5D6-2C3F-4539-8806-4838D643FD61}"/>
+              </a:ext>
+            </a:extLst>
+          </p:cNvPr>
+          <p:cNvPicPr>
+            <a:picLocks noGrp="1"/>
+          </p:cNvPicPr>
+          <p:nvPr>
+            <p:ph idx="1"/>
+          </p:nvPr>
+        </p:nvPicPr>
+        <p:blipFill>
+          <a:blip r:embed="rId2">
+            <a:extLst>
+              <a:ext uri="{28A0092B-C50C-407E-A947-70E740481C1C}">
+                <a14:useLocalDpi xmlns:a14="http://schemas.microsoft.com/office/drawing/2010/main" val="0"/>
+              </a:ext>
+            </a:extLst>
+          </a:blip>
+          <a:stretch>
+            <a:fillRect/>
+          </a:stretch>
+        </p:blipFill>
+        <p:spPr>
+          <a:xfrm>
+            <a:off x="634551" y="1954695"/>
+            <a:ext cx="10886889" cy="4903305"/>
+          </a:xfrm>
+          <a:prstGeom prst="rect">
+            <a:avLst/>
+          </a:prstGeom>
+        </p:spPr>
+      </p:pic>
+    </p:spTree>
+    <p:extLst>
+      <p:ext uri="{BB962C8B-B14F-4D97-AF65-F5344CB8AC3E}">
+        <p14:creationId xmlns:p14="http://schemas.microsoft.com/office/powerpoint/2010/main" val="592040139"/>
+      </p:ext>
+    </p:extLst>
+  </p:cSld>
+  <p:clrMapOvr>
+    <a:masterClrMapping/>
+  </p:clrMapOvr>
+</p:sld>
+</file>
+
 <file path=ppt/slides/slide8.xml><?xml version="1.0" encoding="utf-8"?>
 <p:sld xmlns:a="http://schemas.openxmlformats.org/drawingml/2006/main" xmlns:r="http://schemas.openxmlformats.org/officeDocument/2006/relationships" xmlns:p="http://schemas.openxmlformats.org/presentationml/2006/main">
   <p:cSld>
@@ -37800,7 +39191,7 @@
           <a:p>
             <a:r>
               <a:rPr lang="en-US" dirty="0"/>
-              <a:t>Gann Chart</a:t>
+              <a:t>Gantt Chart-2</a:t>
             </a:r>
           </a:p>
         </p:txBody>

</xml_diff>